<commit_message>
Refined and added Examples
</commit_message>
<xml_diff>
--- a/a-type-of-magic.pptx
+++ b/a-type-of-magic.pptx
@@ -5,7 +5,7 @@
     <p:sldMasterId id="2147483648" r:id="rId1"/>
   </p:sldMasterIdLst>
   <p:notesMasterIdLst>
-    <p:notesMasterId r:id="rId25"/>
+    <p:notesMasterId r:id="rId26"/>
   </p:notesMasterIdLst>
   <p:sldIdLst>
     <p:sldId id="256" r:id="rId2"/>
@@ -27,10 +27,11 @@
     <p:sldId id="269" r:id="rId18"/>
     <p:sldId id="267" r:id="rId19"/>
     <p:sldId id="278" r:id="rId20"/>
-    <p:sldId id="271" r:id="rId21"/>
-    <p:sldId id="270" r:id="rId22"/>
-    <p:sldId id="274" r:id="rId23"/>
-    <p:sldId id="273" r:id="rId24"/>
+    <p:sldId id="279" r:id="rId21"/>
+    <p:sldId id="281" r:id="rId22"/>
+    <p:sldId id="282" r:id="rId23"/>
+    <p:sldId id="270" r:id="rId24"/>
+    <p:sldId id="273" r:id="rId25"/>
   </p:sldIdLst>
   <p:sldSz cx="12192000" cy="6858000"/>
   <p:notesSz cx="6858000" cy="9144000"/>
@@ -8593,6 +8594,12 @@
             <a:endParaRPr lang="de-CH" dirty="0"/>
           </a:p>
           <a:p>
+            <a:endParaRPr lang="de-CH" dirty="0"/>
+          </a:p>
+          <a:p>
+            <a:endParaRPr lang="de-CH" dirty="0"/>
+          </a:p>
+          <a:p>
             <a:r>
               <a:rPr lang="de-CH" dirty="0"/>
               <a:t>Objects </a:t>
@@ -8642,8 +8649,8 @@
         </p:nvSpPr>
         <p:spPr>
           <a:xfrm>
-            <a:off x="1164881" y="4247437"/>
-            <a:ext cx="6955750" cy="2246769"/>
+            <a:off x="580090" y="4156200"/>
+            <a:ext cx="5630067" cy="2031325"/>
           </a:xfrm>
           <a:prstGeom prst="rect">
             <a:avLst/>
@@ -8665,7 +8672,7 @@
           <a:lstStyle/>
           <a:p>
             <a:r>
-              <a:rPr lang="de-CH" sz="2000" dirty="0">
+              <a:rPr lang="de-CH" dirty="0">
                 <a:solidFill>
                   <a:srgbClr val="569CD6"/>
                 </a:solidFill>
@@ -8674,7 +8681,7 @@
               <a:t>type</a:t>
             </a:r>
             <a:r>
-              <a:rPr lang="de-CH" sz="2000" dirty="0">
+              <a:rPr lang="de-CH" dirty="0">
                 <a:solidFill>
                   <a:srgbClr val="D4D4D4"/>
                 </a:solidFill>
@@ -8683,7 +8690,7 @@
               <a:t> </a:t>
             </a:r>
             <a:r>
-              <a:rPr lang="de-CH" sz="2000" dirty="0">
+              <a:rPr lang="de-CH" dirty="0">
                 <a:solidFill>
                   <a:srgbClr val="4EC9B0"/>
                 </a:solidFill>
@@ -8692,7 +8699,7 @@
               <a:t>Person</a:t>
             </a:r>
             <a:r>
-              <a:rPr lang="de-CH" sz="2000" dirty="0">
+              <a:rPr lang="de-CH" dirty="0">
                 <a:solidFill>
                   <a:srgbClr val="D4D4D4"/>
                 </a:solidFill>
@@ -8701,7 +8708,7 @@
               <a:t> = { </a:t>
             </a:r>
             <a:r>
-              <a:rPr lang="de-CH" sz="2000" dirty="0" err="1">
+              <a:rPr lang="de-CH" dirty="0" err="1">
                 <a:solidFill>
                   <a:srgbClr val="9CDCFE"/>
                 </a:solidFill>
@@ -8710,7 +8717,7 @@
               <a:t>name</a:t>
             </a:r>
             <a:r>
-              <a:rPr lang="de-CH" sz="2000" dirty="0">
+              <a:rPr lang="de-CH" dirty="0">
                 <a:solidFill>
                   <a:srgbClr val="D4D4D4"/>
                 </a:solidFill>
@@ -8719,7 +8726,7 @@
               <a:t>: </a:t>
             </a:r>
             <a:r>
-              <a:rPr lang="de-CH" sz="2000" dirty="0" err="1">
+              <a:rPr lang="de-CH" dirty="0" err="1">
                 <a:solidFill>
                   <a:srgbClr val="4EC9B0"/>
                 </a:solidFill>
@@ -8728,7 +8735,7 @@
               <a:t>string</a:t>
             </a:r>
             <a:r>
-              <a:rPr lang="de-CH" sz="2000" dirty="0">
+              <a:rPr lang="de-CH" dirty="0">
                 <a:solidFill>
                   <a:srgbClr val="D4D4D4"/>
                 </a:solidFill>
@@ -8737,7 +8744,7 @@
               <a:t>, </a:t>
             </a:r>
             <a:r>
-              <a:rPr lang="de-CH" sz="2000" dirty="0" err="1">
+              <a:rPr lang="de-CH" dirty="0" err="1">
                 <a:solidFill>
                   <a:srgbClr val="9CDCFE"/>
                 </a:solidFill>
@@ -8746,7 +8753,7 @@
               <a:t>age</a:t>
             </a:r>
             <a:r>
-              <a:rPr lang="de-CH" sz="2000" dirty="0">
+              <a:rPr lang="de-CH" dirty="0">
                 <a:solidFill>
                   <a:srgbClr val="D4D4D4"/>
                 </a:solidFill>
@@ -8755,7 +8762,7 @@
               <a:t>: </a:t>
             </a:r>
             <a:r>
-              <a:rPr lang="de-CH" sz="2000" dirty="0" err="1">
+              <a:rPr lang="de-CH" dirty="0" err="1">
                 <a:solidFill>
                   <a:srgbClr val="4EC9B0"/>
                 </a:solidFill>
@@ -8764,7 +8771,7 @@
               <a:t>number</a:t>
             </a:r>
             <a:r>
-              <a:rPr lang="de-CH" sz="2000" dirty="0">
+              <a:rPr lang="de-CH" dirty="0">
                 <a:solidFill>
                   <a:srgbClr val="D4D4D4"/>
                 </a:solidFill>
@@ -8775,7 +8782,7 @@
           </a:p>
           <a:p>
             <a:r>
-              <a:rPr lang="de-CH" sz="2000" dirty="0">
+              <a:rPr lang="de-CH" dirty="0">
                 <a:solidFill>
                   <a:srgbClr val="569CD6"/>
                 </a:solidFill>
@@ -8784,7 +8791,7 @@
               <a:t>type</a:t>
             </a:r>
             <a:r>
-              <a:rPr lang="de-CH" sz="2000" dirty="0">
+              <a:rPr lang="de-CH" dirty="0">
                 <a:solidFill>
                   <a:srgbClr val="D4D4D4"/>
                 </a:solidFill>
@@ -8793,16 +8800,16 @@
               <a:t> </a:t>
             </a:r>
             <a:r>
-              <a:rPr lang="de-CH" sz="2000" dirty="0" err="1">
+              <a:rPr lang="de-CH" dirty="0">
                 <a:solidFill>
                   <a:srgbClr val="4EC9B0"/>
                 </a:solidFill>
                 <a:latin typeface="Consolas" panose="020B0609020204030204" pitchFamily="49" charset="0"/>
               </a:rPr>
-              <a:t>Serializable</a:t>
-            </a:r>
-            <a:r>
-              <a:rPr lang="de-CH" sz="2000" dirty="0">
+              <a:t>Contact</a:t>
+            </a:r>
+            <a:r>
+              <a:rPr lang="de-CH" dirty="0">
                 <a:solidFill>
                   <a:srgbClr val="D4D4D4"/>
                 </a:solidFill>
@@ -8811,34 +8818,62 @@
               <a:t> = { </a:t>
             </a:r>
             <a:r>
-              <a:rPr lang="de-CH" sz="2000" dirty="0" err="1">
-                <a:solidFill>
-                  <a:srgbClr val="DCDCAA"/>
-                </a:solidFill>
-                <a:latin typeface="Consolas" panose="020B0609020204030204" pitchFamily="49" charset="0"/>
-              </a:rPr>
-              <a:t>serialize</a:t>
-            </a:r>
-            <a:r>
-              <a:rPr lang="de-CH" sz="2000" dirty="0">
-                <a:solidFill>
-                  <a:srgbClr val="D4D4D4"/>
-                </a:solidFill>
-                <a:latin typeface="Consolas" panose="020B0609020204030204" pitchFamily="49" charset="0"/>
-              </a:rPr>
-              <a:t>: () </a:t>
-            </a:r>
-            <a:r>
-              <a:rPr lang="de-CH" sz="2000" dirty="0">
+              <a:rPr lang="de-CH" dirty="0" err="1">
+                <a:solidFill>
+                  <a:srgbClr val="9CDCFE"/>
+                </a:solidFill>
+                <a:latin typeface="Consolas" panose="020B0609020204030204" pitchFamily="49" charset="0"/>
+              </a:rPr>
+              <a:t>phone</a:t>
+            </a:r>
+            <a:r>
+              <a:rPr lang="de-CH" dirty="0">
+                <a:solidFill>
+                  <a:srgbClr val="D4D4D4"/>
+                </a:solidFill>
+                <a:latin typeface="Consolas" panose="020B0609020204030204" pitchFamily="49" charset="0"/>
+              </a:rPr>
+              <a:t>: </a:t>
+            </a:r>
+            <a:r>
+              <a:rPr lang="de-CH" dirty="0" err="1">
+                <a:solidFill>
+                  <a:srgbClr val="4EC9B0"/>
+                </a:solidFill>
+                <a:latin typeface="Consolas" panose="020B0609020204030204" pitchFamily="49" charset="0"/>
+              </a:rPr>
+              <a:t>string</a:t>
+            </a:r>
+            <a:r>
+              <a:rPr lang="de-CH" dirty="0">
+                <a:solidFill>
+                  <a:srgbClr val="D4D4D4"/>
+                </a:solidFill>
+                <a:latin typeface="Consolas" panose="020B0609020204030204" pitchFamily="49" charset="0"/>
+              </a:rPr>
+              <a:t> }</a:t>
+            </a:r>
+          </a:p>
+          <a:p>
+            <a:br>
+              <a:rPr lang="de-CH" dirty="0">
+                <a:solidFill>
+                  <a:srgbClr val="D4D4D4"/>
+                </a:solidFill>
+                <a:latin typeface="Consolas" panose="020B0609020204030204" pitchFamily="49" charset="0"/>
+              </a:rPr>
+            </a:br>
+            <a:r>
+              <a:rPr lang="de-CH" dirty="0" err="1">
                 <a:solidFill>
                   <a:srgbClr val="569CD6"/>
                 </a:solidFill>
                 <a:latin typeface="Consolas" panose="020B0609020204030204" pitchFamily="49" charset="0"/>
               </a:rPr>
-              <a:t>=&gt;</a:t>
-            </a:r>
-            <a:r>
-              <a:rPr lang="de-CH" sz="2000" dirty="0">
+              <a:t>let</a:t>
+            </a:r>
+            <a:r>
+              <a:rPr lang="de-CH" dirty="0">
                 <a:solidFill>
                   <a:srgbClr val="D4D4D4"/>
                 </a:solidFill>
@@ -8847,98 +8882,126 @@
               <a:t> </a:t>
             </a:r>
             <a:r>
-              <a:rPr lang="de-CH" sz="2000" dirty="0" err="1">
+              <a:rPr lang="de-CH" dirty="0">
+                <a:solidFill>
+                  <a:srgbClr val="9CDCFE"/>
+                </a:solidFill>
+                <a:latin typeface="Consolas" panose="020B0609020204030204" pitchFamily="49" charset="0"/>
+              </a:rPr>
+              <a:t>p</a:t>
+            </a:r>
+            <a:r>
+              <a:rPr lang="de-CH" dirty="0">
+                <a:solidFill>
+                  <a:srgbClr val="D4D4D4"/>
+                </a:solidFill>
+                <a:latin typeface="Consolas" panose="020B0609020204030204" pitchFamily="49" charset="0"/>
+              </a:rPr>
+              <a:t>: </a:t>
+            </a:r>
+            <a:r>
+              <a:rPr lang="de-CH" dirty="0">
                 <a:solidFill>
                   <a:srgbClr val="4EC9B0"/>
                 </a:solidFill>
                 <a:latin typeface="Consolas" panose="020B0609020204030204" pitchFamily="49" charset="0"/>
               </a:rPr>
-              <a:t>string</a:t>
-            </a:r>
-            <a:r>
-              <a:rPr lang="de-CH" sz="2000" dirty="0">
-                <a:solidFill>
-                  <a:srgbClr val="D4D4D4"/>
-                </a:solidFill>
-                <a:latin typeface="Consolas" panose="020B0609020204030204" pitchFamily="49" charset="0"/>
-              </a:rPr>
-              <a:t> };</a:t>
-            </a:r>
-          </a:p>
-          <a:p>
-            <a:br>
-              <a:rPr lang="de-CH" sz="2000" dirty="0">
-                <a:solidFill>
-                  <a:srgbClr val="D4D4D4"/>
-                </a:solidFill>
-                <a:latin typeface="Consolas" panose="020B0609020204030204" pitchFamily="49" charset="0"/>
-              </a:rPr>
-            </a:br>
-            <a:r>
-              <a:rPr lang="de-CH" sz="2000" dirty="0" err="1">
-                <a:solidFill>
-                  <a:srgbClr val="569CD6"/>
-                </a:solidFill>
-                <a:latin typeface="Consolas" panose="020B0609020204030204" pitchFamily="49" charset="0"/>
-              </a:rPr>
-              <a:t>let</a:t>
-            </a:r>
-            <a:r>
-              <a:rPr lang="de-CH" sz="2000" dirty="0">
-                <a:solidFill>
-                  <a:srgbClr val="D4D4D4"/>
-                </a:solidFill>
-                <a:latin typeface="Consolas" panose="020B0609020204030204" pitchFamily="49" charset="0"/>
-              </a:rPr>
-              <a:t> </a:t>
-            </a:r>
-            <a:r>
-              <a:rPr lang="de-CH" sz="2000" dirty="0">
+              <a:t>Person</a:t>
+            </a:r>
+            <a:r>
+              <a:rPr lang="de-CH" dirty="0">
+                <a:solidFill>
+                  <a:srgbClr val="D4D4D4"/>
+                </a:solidFill>
+                <a:latin typeface="Consolas" panose="020B0609020204030204" pitchFamily="49" charset="0"/>
+              </a:rPr>
+              <a:t> &amp; </a:t>
+            </a:r>
+            <a:r>
+              <a:rPr lang="de-CH" dirty="0">
+                <a:solidFill>
+                  <a:srgbClr val="4EC9B0"/>
+                </a:solidFill>
+                <a:latin typeface="Consolas" panose="020B0609020204030204" pitchFamily="49" charset="0"/>
+              </a:rPr>
+              <a:t>Contact</a:t>
+            </a:r>
+            <a:r>
+              <a:rPr lang="de-CH" dirty="0">
+                <a:solidFill>
+                  <a:srgbClr val="D4D4D4"/>
+                </a:solidFill>
+                <a:latin typeface="Consolas" panose="020B0609020204030204" pitchFamily="49" charset="0"/>
+              </a:rPr>
+              <a:t> = {};</a:t>
+            </a:r>
+          </a:p>
+          <a:p>
+            <a:r>
+              <a:rPr lang="de-CH" dirty="0">
                 <a:solidFill>
                   <a:srgbClr val="9CDCFE"/>
                 </a:solidFill>
                 <a:latin typeface="Consolas" panose="020B0609020204030204" pitchFamily="49" charset="0"/>
               </a:rPr>
-              <a:t>i</a:t>
-            </a:r>
-            <a:r>
-              <a:rPr lang="de-CH" sz="2000" dirty="0">
-                <a:solidFill>
-                  <a:srgbClr val="D4D4D4"/>
-                </a:solidFill>
-                <a:latin typeface="Consolas" panose="020B0609020204030204" pitchFamily="49" charset="0"/>
-              </a:rPr>
-              <a:t>: </a:t>
-            </a:r>
-            <a:r>
-              <a:rPr lang="de-CH" sz="2000" dirty="0">
-                <a:solidFill>
-                  <a:srgbClr val="4EC9B0"/>
-                </a:solidFill>
-                <a:latin typeface="Consolas" panose="020B0609020204030204" pitchFamily="49" charset="0"/>
-              </a:rPr>
-              <a:t>Person</a:t>
-            </a:r>
-            <a:r>
-              <a:rPr lang="de-CH" sz="2000" dirty="0">
-                <a:solidFill>
-                  <a:srgbClr val="D4D4D4"/>
-                </a:solidFill>
-                <a:latin typeface="Consolas" panose="020B0609020204030204" pitchFamily="49" charset="0"/>
-              </a:rPr>
-              <a:t> &amp; </a:t>
-            </a:r>
-            <a:r>
-              <a:rPr lang="de-CH" sz="2000" dirty="0" err="1">
-                <a:solidFill>
-                  <a:srgbClr val="4EC9B0"/>
-                </a:solidFill>
-                <a:latin typeface="Consolas" panose="020B0609020204030204" pitchFamily="49" charset="0"/>
-              </a:rPr>
-              <a:t>Serializable</a:t>
-            </a:r>
-            <a:r>
-              <a:rPr lang="de-CH" sz="2000" dirty="0">
+              <a:t>p</a:t>
+            </a:r>
+            <a:r>
+              <a:rPr lang="de-CH" dirty="0">
+                <a:solidFill>
+                  <a:srgbClr val="D4D4D4"/>
+                </a:solidFill>
+                <a:latin typeface="Consolas" panose="020B0609020204030204" pitchFamily="49" charset="0"/>
+              </a:rPr>
+              <a:t>.</a:t>
+            </a:r>
+            <a:r>
+              <a:rPr lang="de-CH" dirty="0">
+                <a:solidFill>
+                  <a:srgbClr val="9CDCFE"/>
+                </a:solidFill>
+                <a:latin typeface="Consolas" panose="020B0609020204030204" pitchFamily="49" charset="0"/>
+              </a:rPr>
+              <a:t>name</a:t>
+            </a:r>
+            <a:r>
+              <a:rPr lang="de-CH" dirty="0">
+                <a:solidFill>
+                  <a:srgbClr val="D4D4D4"/>
+                </a:solidFill>
+                <a:latin typeface="Consolas" panose="020B0609020204030204" pitchFamily="49" charset="0"/>
+              </a:rPr>
+              <a:t> = </a:t>
+            </a:r>
+            <a:r>
+              <a:rPr lang="de-CH" dirty="0">
+                <a:solidFill>
+                  <a:srgbClr val="CE9178"/>
+                </a:solidFill>
+                <a:latin typeface="Consolas" panose="020B0609020204030204" pitchFamily="49" charset="0"/>
+              </a:rPr>
+              <a:t>"</a:t>
+            </a:r>
+            <a:r>
+              <a:rPr lang="de-CH" dirty="0" err="1">
+                <a:solidFill>
+                  <a:srgbClr val="CE9178"/>
+                </a:solidFill>
+                <a:latin typeface="Consolas" panose="020B0609020204030204" pitchFamily="49" charset="0"/>
+              </a:rPr>
+              <a:t>JoJo</a:t>
+            </a:r>
+            <a:r>
+              <a:rPr lang="de-CH" dirty="0">
+                <a:solidFill>
+                  <a:srgbClr val="CE9178"/>
+                </a:solidFill>
+                <a:latin typeface="Consolas" panose="020B0609020204030204" pitchFamily="49" charset="0"/>
+              </a:rPr>
+              <a:t>"</a:t>
+            </a:r>
+            <a:r>
+              <a:rPr lang="de-CH" dirty="0">
                 <a:solidFill>
                   <a:srgbClr val="D4D4D4"/>
                 </a:solidFill>
@@ -8949,16 +9012,16 @@
           </a:p>
           <a:p>
             <a:r>
-              <a:rPr lang="de-CH" sz="2000" dirty="0">
+              <a:rPr lang="de-CH" dirty="0" err="1">
                 <a:solidFill>
                   <a:srgbClr val="9CDCFE"/>
                 </a:solidFill>
                 <a:latin typeface="Consolas" panose="020B0609020204030204" pitchFamily="49" charset="0"/>
               </a:rPr>
-              <a:t>i</a:t>
-            </a:r>
-            <a:r>
-              <a:rPr lang="de-CH" sz="2000" dirty="0">
+              <a:t>p</a:t>
+            </a:r>
+            <a:r>
+              <a:rPr lang="de-CH" dirty="0" err="1">
                 <a:solidFill>
                   <a:srgbClr val="D4D4D4"/>
                 </a:solidFill>
@@ -8967,16 +9030,16 @@
               <a:t>.</a:t>
             </a:r>
             <a:r>
-              <a:rPr lang="de-CH" sz="2000" dirty="0">
+              <a:rPr lang="de-CH" dirty="0" err="1">
                 <a:solidFill>
                   <a:srgbClr val="9CDCFE"/>
                 </a:solidFill>
                 <a:latin typeface="Consolas" panose="020B0609020204030204" pitchFamily="49" charset="0"/>
               </a:rPr>
-              <a:t>name</a:t>
-            </a:r>
-            <a:r>
-              <a:rPr lang="de-CH" sz="2000" dirty="0">
+              <a:t>age</a:t>
+            </a:r>
+            <a:r>
+              <a:rPr lang="de-CH" dirty="0">
                 <a:solidFill>
                   <a:srgbClr val="D4D4D4"/>
                 </a:solidFill>
@@ -8985,134 +9048,78 @@
               <a:t> = </a:t>
             </a:r>
             <a:r>
-              <a:rPr lang="de-CH" sz="2000" dirty="0">
+              <a:rPr lang="de-CH" dirty="0">
+                <a:solidFill>
+                  <a:srgbClr val="B5CEA8"/>
+                </a:solidFill>
+                <a:latin typeface="Consolas" panose="020B0609020204030204" pitchFamily="49" charset="0"/>
+              </a:rPr>
+              <a:t>17</a:t>
+            </a:r>
+            <a:r>
+              <a:rPr lang="de-CH" dirty="0">
+                <a:solidFill>
+                  <a:srgbClr val="D4D4D4"/>
+                </a:solidFill>
+                <a:latin typeface="Consolas" panose="020B0609020204030204" pitchFamily="49" charset="0"/>
+              </a:rPr>
+              <a:t>;</a:t>
+            </a:r>
+          </a:p>
+          <a:p>
+            <a:r>
+              <a:rPr lang="de-CH" dirty="0" err="1">
+                <a:solidFill>
+                  <a:srgbClr val="9CDCFE"/>
+                </a:solidFill>
+                <a:latin typeface="Consolas" panose="020B0609020204030204" pitchFamily="49" charset="0"/>
+              </a:rPr>
+              <a:t>p</a:t>
+            </a:r>
+            <a:r>
+              <a:rPr lang="de-CH" dirty="0" err="1">
+                <a:solidFill>
+                  <a:srgbClr val="D4D4D4"/>
+                </a:solidFill>
+                <a:latin typeface="Consolas" panose="020B0609020204030204" pitchFamily="49" charset="0"/>
+              </a:rPr>
+              <a:t>.</a:t>
+            </a:r>
+            <a:r>
+              <a:rPr lang="de-CH" dirty="0" err="1">
+                <a:solidFill>
+                  <a:srgbClr val="9CDCFE"/>
+                </a:solidFill>
+                <a:latin typeface="Consolas" panose="020B0609020204030204" pitchFamily="49" charset="0"/>
+              </a:rPr>
+              <a:t>phone</a:t>
+            </a:r>
+            <a:r>
+              <a:rPr lang="de-CH" dirty="0">
+                <a:solidFill>
+                  <a:srgbClr val="D4D4D4"/>
+                </a:solidFill>
+                <a:latin typeface="Consolas" panose="020B0609020204030204" pitchFamily="49" charset="0"/>
+              </a:rPr>
+              <a:t> = </a:t>
+            </a:r>
+            <a:r>
+              <a:rPr lang="de-CH" dirty="0">
                 <a:solidFill>
                   <a:srgbClr val="CE9178"/>
                 </a:solidFill>
                 <a:latin typeface="Consolas" panose="020B0609020204030204" pitchFamily="49" charset="0"/>
               </a:rPr>
-              <a:t>"</a:t>
-            </a:r>
-            <a:r>
-              <a:rPr lang="de-CH" sz="2000" dirty="0" err="1">
-                <a:solidFill>
-                  <a:srgbClr val="CE9178"/>
-                </a:solidFill>
-                <a:latin typeface="Consolas" panose="020B0609020204030204" pitchFamily="49" charset="0"/>
-              </a:rPr>
-              <a:t>JoJo</a:t>
-            </a:r>
-            <a:r>
-              <a:rPr lang="de-CH" sz="2000" dirty="0">
-                <a:solidFill>
-                  <a:srgbClr val="CE9178"/>
-                </a:solidFill>
-                <a:latin typeface="Consolas" panose="020B0609020204030204" pitchFamily="49" charset="0"/>
-              </a:rPr>
-              <a:t>"</a:t>
-            </a:r>
-            <a:r>
-              <a:rPr lang="de-CH" sz="2000" dirty="0">
+              <a:t>"079 123 45 67"</a:t>
+            </a:r>
+            <a:r>
+              <a:rPr lang="de-CH" dirty="0">
                 <a:solidFill>
                   <a:srgbClr val="D4D4D4"/>
                 </a:solidFill>
                 <a:latin typeface="Consolas" panose="020B0609020204030204" pitchFamily="49" charset="0"/>
               </a:rPr>
               <a:t>;</a:t>
-            </a:r>
-          </a:p>
-          <a:p>
-            <a:r>
-              <a:rPr lang="de-CH" sz="2000" dirty="0" err="1">
-                <a:solidFill>
-                  <a:srgbClr val="9CDCFE"/>
-                </a:solidFill>
-                <a:latin typeface="Consolas" panose="020B0609020204030204" pitchFamily="49" charset="0"/>
-              </a:rPr>
-              <a:t>i</a:t>
-            </a:r>
-            <a:r>
-              <a:rPr lang="de-CH" sz="2000" dirty="0" err="1">
-                <a:solidFill>
-                  <a:srgbClr val="D4D4D4"/>
-                </a:solidFill>
-                <a:latin typeface="Consolas" panose="020B0609020204030204" pitchFamily="49" charset="0"/>
-              </a:rPr>
-              <a:t>.</a:t>
-            </a:r>
-            <a:r>
-              <a:rPr lang="de-CH" sz="2000" dirty="0" err="1">
-                <a:solidFill>
-                  <a:srgbClr val="9CDCFE"/>
-                </a:solidFill>
-                <a:latin typeface="Consolas" panose="020B0609020204030204" pitchFamily="49" charset="0"/>
-              </a:rPr>
-              <a:t>age</a:t>
-            </a:r>
-            <a:r>
-              <a:rPr lang="de-CH" sz="2000" dirty="0">
-                <a:solidFill>
-                  <a:srgbClr val="D4D4D4"/>
-                </a:solidFill>
-                <a:latin typeface="Consolas" panose="020B0609020204030204" pitchFamily="49" charset="0"/>
-              </a:rPr>
-              <a:t> = </a:t>
-            </a:r>
-            <a:r>
-              <a:rPr lang="de-CH" sz="2000" dirty="0">
-                <a:solidFill>
-                  <a:srgbClr val="B5CEA8"/>
-                </a:solidFill>
-                <a:latin typeface="Consolas" panose="020B0609020204030204" pitchFamily="49" charset="0"/>
-              </a:rPr>
-              <a:t>17</a:t>
-            </a:r>
-            <a:r>
-              <a:rPr lang="de-CH" sz="2000" dirty="0">
-                <a:solidFill>
-                  <a:srgbClr val="D4D4D4"/>
-                </a:solidFill>
-                <a:latin typeface="Consolas" panose="020B0609020204030204" pitchFamily="49" charset="0"/>
-              </a:rPr>
-              <a:t>;</a:t>
-            </a:r>
-          </a:p>
-          <a:p>
-            <a:r>
-              <a:rPr lang="de-CH" sz="2000" dirty="0" err="1">
-                <a:solidFill>
-                  <a:srgbClr val="9CDCFE"/>
-                </a:solidFill>
-                <a:latin typeface="Consolas" panose="020B0609020204030204" pitchFamily="49" charset="0"/>
-              </a:rPr>
-              <a:t>i</a:t>
-            </a:r>
-            <a:r>
-              <a:rPr lang="de-CH" sz="2000" dirty="0" err="1">
-                <a:solidFill>
-                  <a:srgbClr val="D4D4D4"/>
-                </a:solidFill>
-                <a:latin typeface="Consolas" panose="020B0609020204030204" pitchFamily="49" charset="0"/>
-              </a:rPr>
-              <a:t>.</a:t>
-            </a:r>
-            <a:r>
-              <a:rPr lang="de-CH" sz="2000" dirty="0" err="1">
-                <a:solidFill>
-                  <a:srgbClr val="DCDCAA"/>
-                </a:solidFill>
-                <a:latin typeface="Consolas" panose="020B0609020204030204" pitchFamily="49" charset="0"/>
-              </a:rPr>
-              <a:t>serialize</a:t>
-            </a:r>
-            <a:r>
-              <a:rPr lang="de-CH" sz="2000" dirty="0">
-                <a:solidFill>
-                  <a:srgbClr val="D4D4D4"/>
-                </a:solidFill>
-                <a:latin typeface="Consolas" panose="020B0609020204030204" pitchFamily="49" charset="0"/>
-              </a:rPr>
-              <a:t>();</a:t>
             </a:r>
           </a:p>
         </p:txBody>
@@ -9177,8 +9184,8 @@
         </p:blipFill>
         <p:spPr bwMode="auto">
           <a:xfrm>
-            <a:off x="6997276" y="344044"/>
-            <a:ext cx="4959629" cy="3354130"/>
+            <a:off x="6363586" y="216453"/>
+            <a:ext cx="5784706" cy="3912118"/>
           </a:xfrm>
           <a:prstGeom prst="rect">
             <a:avLst/>
@@ -9211,7 +9218,7 @@
             </p:nvSpPr>
             <p:spPr>
               <a:xfrm>
-                <a:off x="2535904" y="1559444"/>
+                <a:off x="2147815" y="914309"/>
                 <a:ext cx="2061334" cy="923330"/>
               </a:xfrm>
               <a:prstGeom prst="rect">
@@ -9277,7 +9284,7 @@
             </p:nvSpPr>
             <p:spPr>
               <a:xfrm>
-                <a:off x="2535904" y="1559444"/>
+                <a:off x="2147815" y="914309"/>
                 <a:ext cx="2061334" cy="923330"/>
               </a:xfrm>
               <a:prstGeom prst="rect">
@@ -9394,6 +9401,9 @@
             <a:endParaRPr lang="de-CH" dirty="0"/>
           </a:p>
           <a:p>
+            <a:endParaRPr lang="de-CH" dirty="0"/>
+          </a:p>
+          <a:p>
             <a:r>
               <a:rPr lang="de-CH" dirty="0"/>
               <a:t>The </a:t>
@@ -9492,8 +9502,8 @@
         </p:blipFill>
         <p:spPr bwMode="auto">
           <a:xfrm>
-            <a:off x="7029061" y="365125"/>
-            <a:ext cx="4870579" cy="3330952"/>
+            <a:off x="6300730" y="205637"/>
+            <a:ext cx="5785200" cy="3956454"/>
           </a:xfrm>
           <a:prstGeom prst="rect">
             <a:avLst/>
@@ -9524,7 +9534,7 @@
         </p:nvSpPr>
         <p:spPr>
           <a:xfrm>
-            <a:off x="1183543" y="4273401"/>
+            <a:off x="588120" y="3816201"/>
             <a:ext cx="3429144" cy="1015663"/>
           </a:xfrm>
           <a:prstGeom prst="rect">
@@ -9713,7 +9723,7 @@
             </p:nvSpPr>
             <p:spPr>
               <a:xfrm>
-                <a:off x="2672753" y="1568936"/>
+                <a:off x="2194288" y="904401"/>
                 <a:ext cx="2061334" cy="923330"/>
               </a:xfrm>
               <a:prstGeom prst="rect">
@@ -9779,7 +9789,7 @@
             </p:nvSpPr>
             <p:spPr>
               <a:xfrm>
-                <a:off x="2672753" y="1568936"/>
+                <a:off x="2194288" y="904401"/>
                 <a:ext cx="2061334" cy="923330"/>
               </a:xfrm>
               <a:prstGeom prst="rect">
@@ -11342,7 +11352,7 @@
           <p:cNvPr id="2" name="Title 1">
             <a:extLst>
               <a:ext uri="{FF2B5EF4-FFF2-40B4-BE49-F238E27FC236}">
-                <a16:creationId xmlns:a16="http://schemas.microsoft.com/office/drawing/2014/main" id="{956EFEE4-944A-4783-BE59-8B0153C0CC2A}"/>
+                <a16:creationId xmlns:a16="http://schemas.microsoft.com/office/drawing/2014/main" id="{881C8C4A-DA34-4933-BE30-83EDE40DD3F3}"/>
               </a:ext>
             </a:extLst>
           </p:cNvPr>
@@ -11358,7 +11368,10 @@
           <a:bodyPr/>
           <a:lstStyle/>
           <a:p>
-            <a:endParaRPr lang="en-GB"/>
+            <a:r>
+              <a:rPr lang="en-GB" dirty="0"/>
+              <a:t>Example of using Union Types</a:t>
+            </a:r>
           </a:p>
         </p:txBody>
       </p:sp>
@@ -11367,7 +11380,7 @@
           <p:cNvPr id="3" name="Content Placeholder 2">
             <a:extLst>
               <a:ext uri="{FF2B5EF4-FFF2-40B4-BE49-F238E27FC236}">
-                <a16:creationId xmlns:a16="http://schemas.microsoft.com/office/drawing/2014/main" id="{A5A623C0-7610-415B-B79C-6218591E66F6}"/>
+                <a16:creationId xmlns:a16="http://schemas.microsoft.com/office/drawing/2014/main" id="{DD7A9F0C-3198-4D5F-B54B-3C995CC9FC18}"/>
               </a:ext>
             </a:extLst>
           </p:cNvPr>
@@ -11383,32 +11396,3552 @@
           <a:bodyPr/>
           <a:lstStyle/>
           <a:p>
-            <a:r>
-              <a:rPr lang="de-CH" dirty="0" err="1"/>
-              <a:t>Examples</a:t>
-            </a:r>
-            <a:r>
-              <a:rPr lang="de-CH" dirty="0"/>
-              <a:t> / Use Cases</a:t>
-            </a:r>
+            <a:pPr marL="0" indent="0">
+              <a:buNone/>
+            </a:pPr>
             <a:endParaRPr lang="en-GB" dirty="0"/>
+          </a:p>
+        </p:txBody>
+      </p:sp>
+      <p:sp>
+        <p:nvSpPr>
+          <p:cNvPr id="4" name="Rectangle 3">
+            <a:extLst>
+              <a:ext uri="{FF2B5EF4-FFF2-40B4-BE49-F238E27FC236}">
+                <a16:creationId xmlns:a16="http://schemas.microsoft.com/office/drawing/2014/main" id="{0217E739-B41C-417F-B235-6F10CF968E55}"/>
+              </a:ext>
+            </a:extLst>
+          </p:cNvPr>
+          <p:cNvSpPr/>
+          <p:nvPr/>
+        </p:nvSpPr>
+        <p:spPr>
+          <a:xfrm>
+            <a:off x="268308" y="1184858"/>
+            <a:ext cx="11655379" cy="4524315"/>
+          </a:xfrm>
+          <a:prstGeom prst="rect">
+            <a:avLst/>
+          </a:prstGeom>
+          <a:solidFill>
+            <a:schemeClr val="tx1">
+              <a:lumMod val="75000"/>
+              <a:lumOff val="25000"/>
+            </a:schemeClr>
+          </a:solidFill>
+          <a:ln>
+            <a:noFill/>
+          </a:ln>
+        </p:spPr>
+        <p:txBody>
+          <a:bodyPr wrap="square">
+            <a:spAutoFit/>
+          </a:bodyPr>
+          <a:lstStyle/>
+          <a:p>
+            <a:r>
+              <a:rPr lang="de-CH" dirty="0">
+                <a:solidFill>
+                  <a:srgbClr val="569CD6"/>
+                </a:solidFill>
+                <a:latin typeface="Consolas" panose="020B0609020204030204" pitchFamily="49" charset="0"/>
+              </a:rPr>
+              <a:t>type</a:t>
+            </a:r>
+            <a:r>
+              <a:rPr lang="de-CH" dirty="0">
+                <a:solidFill>
+                  <a:srgbClr val="D4D4D4"/>
+                </a:solidFill>
+                <a:latin typeface="Consolas" panose="020B0609020204030204" pitchFamily="49" charset="0"/>
+              </a:rPr>
+              <a:t> </a:t>
+            </a:r>
+            <a:r>
+              <a:rPr lang="de-CH" dirty="0" err="1">
+                <a:solidFill>
+                  <a:srgbClr val="4EC9B0"/>
+                </a:solidFill>
+                <a:latin typeface="Consolas" panose="020B0609020204030204" pitchFamily="49" charset="0"/>
+              </a:rPr>
+              <a:t>InitAction</a:t>
+            </a:r>
+            <a:r>
+              <a:rPr lang="de-CH" dirty="0">
+                <a:solidFill>
+                  <a:srgbClr val="D4D4D4"/>
+                </a:solidFill>
+                <a:latin typeface="Consolas" panose="020B0609020204030204" pitchFamily="49" charset="0"/>
+              </a:rPr>
+              <a:t> = { </a:t>
+            </a:r>
+            <a:r>
+              <a:rPr lang="de-CH" dirty="0">
+                <a:solidFill>
+                  <a:srgbClr val="9CDCFE"/>
+                </a:solidFill>
+                <a:latin typeface="Consolas" panose="020B0609020204030204" pitchFamily="49" charset="0"/>
+              </a:rPr>
+              <a:t>type</a:t>
+            </a:r>
+            <a:r>
+              <a:rPr lang="de-CH" dirty="0">
+                <a:solidFill>
+                  <a:srgbClr val="D4D4D4"/>
+                </a:solidFill>
+                <a:latin typeface="Consolas" panose="020B0609020204030204" pitchFamily="49" charset="0"/>
+              </a:rPr>
+              <a:t>: </a:t>
+            </a:r>
+            <a:r>
+              <a:rPr lang="de-CH" dirty="0">
+                <a:solidFill>
+                  <a:srgbClr val="CE9178"/>
+                </a:solidFill>
+                <a:latin typeface="Consolas" panose="020B0609020204030204" pitchFamily="49" charset="0"/>
+              </a:rPr>
+              <a:t>"INIT"</a:t>
+            </a:r>
+            <a:r>
+              <a:rPr lang="de-CH" dirty="0">
+                <a:solidFill>
+                  <a:srgbClr val="D4D4D4"/>
+                </a:solidFill>
+                <a:latin typeface="Consolas" panose="020B0609020204030204" pitchFamily="49" charset="0"/>
+              </a:rPr>
+              <a:t> }</a:t>
+            </a:r>
+          </a:p>
+          <a:p>
+            <a:r>
+              <a:rPr lang="de-CH" dirty="0">
+                <a:solidFill>
+                  <a:srgbClr val="569CD6"/>
+                </a:solidFill>
+                <a:latin typeface="Consolas" panose="020B0609020204030204" pitchFamily="49" charset="0"/>
+              </a:rPr>
+              <a:t>type</a:t>
+            </a:r>
+            <a:r>
+              <a:rPr lang="de-CH" dirty="0">
+                <a:solidFill>
+                  <a:srgbClr val="D4D4D4"/>
+                </a:solidFill>
+                <a:latin typeface="Consolas" panose="020B0609020204030204" pitchFamily="49" charset="0"/>
+              </a:rPr>
+              <a:t> </a:t>
+            </a:r>
+            <a:r>
+              <a:rPr lang="de-CH" dirty="0" err="1">
+                <a:solidFill>
+                  <a:srgbClr val="4EC9B0"/>
+                </a:solidFill>
+                <a:latin typeface="Consolas" panose="020B0609020204030204" pitchFamily="49" charset="0"/>
+              </a:rPr>
+              <a:t>LoginAction</a:t>
+            </a:r>
+            <a:r>
+              <a:rPr lang="de-CH" dirty="0">
+                <a:solidFill>
+                  <a:srgbClr val="D4D4D4"/>
+                </a:solidFill>
+                <a:latin typeface="Consolas" panose="020B0609020204030204" pitchFamily="49" charset="0"/>
+              </a:rPr>
+              <a:t> = { </a:t>
+            </a:r>
+            <a:r>
+              <a:rPr lang="de-CH" dirty="0">
+                <a:solidFill>
+                  <a:srgbClr val="9CDCFE"/>
+                </a:solidFill>
+                <a:latin typeface="Consolas" panose="020B0609020204030204" pitchFamily="49" charset="0"/>
+              </a:rPr>
+              <a:t>type</a:t>
+            </a:r>
+            <a:r>
+              <a:rPr lang="de-CH" dirty="0">
+                <a:solidFill>
+                  <a:srgbClr val="D4D4D4"/>
+                </a:solidFill>
+                <a:latin typeface="Consolas" panose="020B0609020204030204" pitchFamily="49" charset="0"/>
+              </a:rPr>
+              <a:t>: </a:t>
+            </a:r>
+            <a:r>
+              <a:rPr lang="de-CH" dirty="0">
+                <a:solidFill>
+                  <a:srgbClr val="CE9178"/>
+                </a:solidFill>
+                <a:latin typeface="Consolas" panose="020B0609020204030204" pitchFamily="49" charset="0"/>
+              </a:rPr>
+              <a:t>"LOGIN"</a:t>
+            </a:r>
+            <a:r>
+              <a:rPr lang="de-CH" dirty="0">
+                <a:solidFill>
+                  <a:srgbClr val="D4D4D4"/>
+                </a:solidFill>
+                <a:latin typeface="Consolas" panose="020B0609020204030204" pitchFamily="49" charset="0"/>
+              </a:rPr>
+              <a:t>, </a:t>
+            </a:r>
+            <a:r>
+              <a:rPr lang="de-CH" dirty="0" err="1">
+                <a:solidFill>
+                  <a:srgbClr val="9CDCFE"/>
+                </a:solidFill>
+                <a:latin typeface="Consolas" panose="020B0609020204030204" pitchFamily="49" charset="0"/>
+              </a:rPr>
+              <a:t>name</a:t>
+            </a:r>
+            <a:r>
+              <a:rPr lang="de-CH" dirty="0">
+                <a:solidFill>
+                  <a:srgbClr val="D4D4D4"/>
+                </a:solidFill>
+                <a:latin typeface="Consolas" panose="020B0609020204030204" pitchFamily="49" charset="0"/>
+              </a:rPr>
+              <a:t>: </a:t>
+            </a:r>
+            <a:r>
+              <a:rPr lang="de-CH" dirty="0" err="1">
+                <a:solidFill>
+                  <a:srgbClr val="4EC9B0"/>
+                </a:solidFill>
+                <a:latin typeface="Consolas" panose="020B0609020204030204" pitchFamily="49" charset="0"/>
+              </a:rPr>
+              <a:t>string</a:t>
+            </a:r>
+            <a:r>
+              <a:rPr lang="de-CH" dirty="0">
+                <a:solidFill>
+                  <a:srgbClr val="D4D4D4"/>
+                </a:solidFill>
+                <a:latin typeface="Consolas" panose="020B0609020204030204" pitchFamily="49" charset="0"/>
+              </a:rPr>
+              <a:t>, </a:t>
+            </a:r>
+            <a:r>
+              <a:rPr lang="de-CH" dirty="0" err="1">
+                <a:solidFill>
+                  <a:srgbClr val="9CDCFE"/>
+                </a:solidFill>
+                <a:latin typeface="Consolas" panose="020B0609020204030204" pitchFamily="49" charset="0"/>
+              </a:rPr>
+              <a:t>password</a:t>
+            </a:r>
+            <a:r>
+              <a:rPr lang="de-CH" dirty="0">
+                <a:solidFill>
+                  <a:srgbClr val="D4D4D4"/>
+                </a:solidFill>
+                <a:latin typeface="Consolas" panose="020B0609020204030204" pitchFamily="49" charset="0"/>
+              </a:rPr>
+              <a:t>: </a:t>
+            </a:r>
+            <a:r>
+              <a:rPr lang="de-CH" dirty="0" err="1">
+                <a:solidFill>
+                  <a:srgbClr val="4EC9B0"/>
+                </a:solidFill>
+                <a:latin typeface="Consolas" panose="020B0609020204030204" pitchFamily="49" charset="0"/>
+              </a:rPr>
+              <a:t>string</a:t>
+            </a:r>
+            <a:r>
+              <a:rPr lang="de-CH" dirty="0">
+                <a:solidFill>
+                  <a:srgbClr val="D4D4D4"/>
+                </a:solidFill>
+                <a:latin typeface="Consolas" panose="020B0609020204030204" pitchFamily="49" charset="0"/>
+              </a:rPr>
+              <a:t> }</a:t>
+            </a:r>
+          </a:p>
+          <a:p>
+            <a:br>
+              <a:rPr lang="de-CH" dirty="0">
+                <a:solidFill>
+                  <a:srgbClr val="D4D4D4"/>
+                </a:solidFill>
+                <a:latin typeface="Consolas" panose="020B0609020204030204" pitchFamily="49" charset="0"/>
+              </a:rPr>
+            </a:br>
+            <a:r>
+              <a:rPr lang="de-CH" dirty="0">
+                <a:solidFill>
+                  <a:srgbClr val="569CD6"/>
+                </a:solidFill>
+                <a:latin typeface="Consolas" panose="020B0609020204030204" pitchFamily="49" charset="0"/>
+              </a:rPr>
+              <a:t>type</a:t>
+            </a:r>
+            <a:r>
+              <a:rPr lang="de-CH" dirty="0">
+                <a:solidFill>
+                  <a:srgbClr val="D4D4D4"/>
+                </a:solidFill>
+                <a:latin typeface="Consolas" panose="020B0609020204030204" pitchFamily="49" charset="0"/>
+              </a:rPr>
+              <a:t> </a:t>
+            </a:r>
+            <a:r>
+              <a:rPr lang="de-CH" dirty="0">
+                <a:solidFill>
+                  <a:srgbClr val="4EC9B0"/>
+                </a:solidFill>
+                <a:latin typeface="Consolas" panose="020B0609020204030204" pitchFamily="49" charset="0"/>
+              </a:rPr>
+              <a:t>Actions</a:t>
+            </a:r>
+            <a:r>
+              <a:rPr lang="de-CH" dirty="0">
+                <a:solidFill>
+                  <a:srgbClr val="D4D4D4"/>
+                </a:solidFill>
+                <a:latin typeface="Consolas" panose="020B0609020204030204" pitchFamily="49" charset="0"/>
+              </a:rPr>
+              <a:t> = </a:t>
+            </a:r>
+            <a:r>
+              <a:rPr lang="de-CH" dirty="0" err="1">
+                <a:solidFill>
+                  <a:srgbClr val="4EC9B0"/>
+                </a:solidFill>
+                <a:latin typeface="Consolas" panose="020B0609020204030204" pitchFamily="49" charset="0"/>
+              </a:rPr>
+              <a:t>InitAction</a:t>
+            </a:r>
+            <a:r>
+              <a:rPr lang="de-CH" dirty="0">
+                <a:solidFill>
+                  <a:srgbClr val="D4D4D4"/>
+                </a:solidFill>
+                <a:latin typeface="Consolas" panose="020B0609020204030204" pitchFamily="49" charset="0"/>
+              </a:rPr>
+              <a:t> | </a:t>
+            </a:r>
+            <a:r>
+              <a:rPr lang="de-CH" dirty="0" err="1">
+                <a:solidFill>
+                  <a:srgbClr val="4EC9B0"/>
+                </a:solidFill>
+                <a:latin typeface="Consolas" panose="020B0609020204030204" pitchFamily="49" charset="0"/>
+              </a:rPr>
+              <a:t>LoginAction</a:t>
+            </a:r>
+            <a:r>
+              <a:rPr lang="de-CH" dirty="0">
+                <a:solidFill>
+                  <a:srgbClr val="D4D4D4"/>
+                </a:solidFill>
+                <a:latin typeface="Consolas" panose="020B0609020204030204" pitchFamily="49" charset="0"/>
+              </a:rPr>
+              <a:t>;</a:t>
+            </a:r>
+          </a:p>
+          <a:p>
+            <a:br>
+              <a:rPr lang="de-CH" dirty="0">
+                <a:solidFill>
+                  <a:srgbClr val="D4D4D4"/>
+                </a:solidFill>
+                <a:latin typeface="Consolas" panose="020B0609020204030204" pitchFamily="49" charset="0"/>
+              </a:rPr>
+            </a:br>
+            <a:r>
+              <a:rPr lang="de-CH" dirty="0" err="1">
+                <a:solidFill>
+                  <a:srgbClr val="569CD6"/>
+                </a:solidFill>
+                <a:latin typeface="Consolas" panose="020B0609020204030204" pitchFamily="49" charset="0"/>
+              </a:rPr>
+              <a:t>function</a:t>
+            </a:r>
+            <a:r>
+              <a:rPr lang="de-CH" dirty="0">
+                <a:solidFill>
+                  <a:srgbClr val="D4D4D4"/>
+                </a:solidFill>
+                <a:latin typeface="Consolas" panose="020B0609020204030204" pitchFamily="49" charset="0"/>
+              </a:rPr>
+              <a:t> </a:t>
+            </a:r>
+            <a:r>
+              <a:rPr lang="de-CH" dirty="0" err="1">
+                <a:solidFill>
+                  <a:srgbClr val="DCDCAA"/>
+                </a:solidFill>
+                <a:latin typeface="Consolas" panose="020B0609020204030204" pitchFamily="49" charset="0"/>
+              </a:rPr>
+              <a:t>handleAction</a:t>
+            </a:r>
+            <a:r>
+              <a:rPr lang="de-CH" dirty="0">
+                <a:solidFill>
+                  <a:srgbClr val="D4D4D4"/>
+                </a:solidFill>
+                <a:latin typeface="Consolas" panose="020B0609020204030204" pitchFamily="49" charset="0"/>
+              </a:rPr>
+              <a:t>(</a:t>
+            </a:r>
+            <a:r>
+              <a:rPr lang="de-CH" dirty="0" err="1">
+                <a:solidFill>
+                  <a:srgbClr val="9CDCFE"/>
+                </a:solidFill>
+                <a:latin typeface="Consolas" panose="020B0609020204030204" pitchFamily="49" charset="0"/>
+              </a:rPr>
+              <a:t>action</a:t>
+            </a:r>
+            <a:r>
+              <a:rPr lang="de-CH" dirty="0">
+                <a:solidFill>
+                  <a:srgbClr val="D4D4D4"/>
+                </a:solidFill>
+                <a:latin typeface="Consolas" panose="020B0609020204030204" pitchFamily="49" charset="0"/>
+              </a:rPr>
+              <a:t>: </a:t>
+            </a:r>
+            <a:r>
+              <a:rPr lang="de-CH" dirty="0">
+                <a:solidFill>
+                  <a:srgbClr val="4EC9B0"/>
+                </a:solidFill>
+                <a:latin typeface="Consolas" panose="020B0609020204030204" pitchFamily="49" charset="0"/>
+              </a:rPr>
+              <a:t>Actions</a:t>
+            </a:r>
+            <a:r>
+              <a:rPr lang="de-CH" dirty="0">
+                <a:solidFill>
+                  <a:srgbClr val="D4D4D4"/>
+                </a:solidFill>
+                <a:latin typeface="Consolas" panose="020B0609020204030204" pitchFamily="49" charset="0"/>
+              </a:rPr>
+              <a:t>) {</a:t>
+            </a:r>
+          </a:p>
+          <a:p>
+            <a:r>
+              <a:rPr lang="de-CH" dirty="0">
+                <a:solidFill>
+                  <a:srgbClr val="C586C0"/>
+                </a:solidFill>
+                <a:latin typeface="Consolas" panose="020B0609020204030204" pitchFamily="49" charset="0"/>
+              </a:rPr>
+              <a:t>  switch</a:t>
+            </a:r>
+            <a:r>
+              <a:rPr lang="de-CH" dirty="0">
+                <a:solidFill>
+                  <a:srgbClr val="D4D4D4"/>
+                </a:solidFill>
+                <a:latin typeface="Consolas" panose="020B0609020204030204" pitchFamily="49" charset="0"/>
+              </a:rPr>
+              <a:t> (</a:t>
+            </a:r>
+            <a:r>
+              <a:rPr lang="de-CH" dirty="0" err="1">
+                <a:solidFill>
+                  <a:srgbClr val="9CDCFE"/>
+                </a:solidFill>
+                <a:latin typeface="Consolas" panose="020B0609020204030204" pitchFamily="49" charset="0"/>
+              </a:rPr>
+              <a:t>action</a:t>
+            </a:r>
+            <a:r>
+              <a:rPr lang="de-CH" dirty="0" err="1">
+                <a:solidFill>
+                  <a:srgbClr val="D4D4D4"/>
+                </a:solidFill>
+                <a:latin typeface="Consolas" panose="020B0609020204030204" pitchFamily="49" charset="0"/>
+              </a:rPr>
+              <a:t>.</a:t>
+            </a:r>
+            <a:r>
+              <a:rPr lang="de-CH" dirty="0" err="1">
+                <a:solidFill>
+                  <a:srgbClr val="9CDCFE"/>
+                </a:solidFill>
+                <a:latin typeface="Consolas" panose="020B0609020204030204" pitchFamily="49" charset="0"/>
+              </a:rPr>
+              <a:t>type</a:t>
+            </a:r>
+            <a:r>
+              <a:rPr lang="de-CH" dirty="0">
+                <a:solidFill>
+                  <a:srgbClr val="D4D4D4"/>
+                </a:solidFill>
+                <a:latin typeface="Consolas" panose="020B0609020204030204" pitchFamily="49" charset="0"/>
+              </a:rPr>
+              <a:t>) {</a:t>
+            </a:r>
+          </a:p>
+          <a:p>
+            <a:r>
+              <a:rPr lang="de-CH" dirty="0">
+                <a:solidFill>
+                  <a:srgbClr val="C586C0"/>
+                </a:solidFill>
+                <a:latin typeface="Consolas" panose="020B0609020204030204" pitchFamily="49" charset="0"/>
+              </a:rPr>
+              <a:t>    </a:t>
+            </a:r>
+            <a:r>
+              <a:rPr lang="de-CH" dirty="0" err="1">
+                <a:solidFill>
+                  <a:srgbClr val="C586C0"/>
+                </a:solidFill>
+                <a:latin typeface="Consolas" panose="020B0609020204030204" pitchFamily="49" charset="0"/>
+              </a:rPr>
+              <a:t>case</a:t>
+            </a:r>
+            <a:r>
+              <a:rPr lang="de-CH" dirty="0">
+                <a:solidFill>
+                  <a:srgbClr val="D4D4D4"/>
+                </a:solidFill>
+                <a:latin typeface="Consolas" panose="020B0609020204030204" pitchFamily="49" charset="0"/>
+              </a:rPr>
+              <a:t> </a:t>
+            </a:r>
+            <a:r>
+              <a:rPr lang="de-CH" dirty="0">
+                <a:solidFill>
+                  <a:srgbClr val="CE9178"/>
+                </a:solidFill>
+                <a:latin typeface="Consolas" panose="020B0609020204030204" pitchFamily="49" charset="0"/>
+              </a:rPr>
+              <a:t>"INIT"</a:t>
+            </a:r>
+            <a:r>
+              <a:rPr lang="de-CH" dirty="0">
+                <a:solidFill>
+                  <a:srgbClr val="D4D4D4"/>
+                </a:solidFill>
+                <a:latin typeface="Consolas" panose="020B0609020204030204" pitchFamily="49" charset="0"/>
+              </a:rPr>
+              <a:t>:</a:t>
+            </a:r>
+          </a:p>
+          <a:p>
+            <a:r>
+              <a:rPr lang="de-CH" dirty="0">
+                <a:solidFill>
+                  <a:srgbClr val="C586C0"/>
+                </a:solidFill>
+                <a:latin typeface="Consolas" panose="020B0609020204030204" pitchFamily="49" charset="0"/>
+              </a:rPr>
+              <a:t>      </a:t>
+            </a:r>
+            <a:r>
+              <a:rPr lang="de-CH" dirty="0" err="1">
+                <a:solidFill>
+                  <a:srgbClr val="C586C0"/>
+                </a:solidFill>
+                <a:latin typeface="Consolas" panose="020B0609020204030204" pitchFamily="49" charset="0"/>
+              </a:rPr>
+              <a:t>return</a:t>
+            </a:r>
+            <a:r>
+              <a:rPr lang="de-CH" dirty="0">
+                <a:solidFill>
+                  <a:srgbClr val="D4D4D4"/>
+                </a:solidFill>
+                <a:latin typeface="Consolas" panose="020B0609020204030204" pitchFamily="49" charset="0"/>
+              </a:rPr>
+              <a:t> </a:t>
+            </a:r>
+            <a:r>
+              <a:rPr lang="de-CH" dirty="0">
+                <a:solidFill>
+                  <a:srgbClr val="CE9178"/>
+                </a:solidFill>
+                <a:latin typeface="Consolas" panose="020B0609020204030204" pitchFamily="49" charset="0"/>
+              </a:rPr>
+              <a:t>"</a:t>
+            </a:r>
+            <a:r>
+              <a:rPr lang="de-CH" dirty="0" err="1">
+                <a:solidFill>
+                  <a:srgbClr val="CE9178"/>
+                </a:solidFill>
+                <a:latin typeface="Consolas" panose="020B0609020204030204" pitchFamily="49" charset="0"/>
+              </a:rPr>
+              <a:t>Initialized</a:t>
+            </a:r>
+            <a:r>
+              <a:rPr lang="de-CH" dirty="0">
+                <a:solidFill>
+                  <a:srgbClr val="CE9178"/>
+                </a:solidFill>
+                <a:latin typeface="Consolas" panose="020B0609020204030204" pitchFamily="49" charset="0"/>
+              </a:rPr>
+              <a:t>"</a:t>
+            </a:r>
+            <a:r>
+              <a:rPr lang="de-CH" dirty="0">
+                <a:solidFill>
+                  <a:srgbClr val="D4D4D4"/>
+                </a:solidFill>
+                <a:latin typeface="Consolas" panose="020B0609020204030204" pitchFamily="49" charset="0"/>
+              </a:rPr>
+              <a:t>;</a:t>
+            </a:r>
+          </a:p>
+          <a:p>
+            <a:r>
+              <a:rPr lang="de-CH" dirty="0">
+                <a:solidFill>
+                  <a:srgbClr val="C586C0"/>
+                </a:solidFill>
+                <a:latin typeface="Consolas" panose="020B0609020204030204" pitchFamily="49" charset="0"/>
+              </a:rPr>
+              <a:t>    </a:t>
+            </a:r>
+            <a:r>
+              <a:rPr lang="de-CH" dirty="0" err="1">
+                <a:solidFill>
+                  <a:srgbClr val="C586C0"/>
+                </a:solidFill>
+                <a:latin typeface="Consolas" panose="020B0609020204030204" pitchFamily="49" charset="0"/>
+              </a:rPr>
+              <a:t>case</a:t>
+            </a:r>
+            <a:r>
+              <a:rPr lang="de-CH" dirty="0">
+                <a:solidFill>
+                  <a:srgbClr val="D4D4D4"/>
+                </a:solidFill>
+                <a:latin typeface="Consolas" panose="020B0609020204030204" pitchFamily="49" charset="0"/>
+              </a:rPr>
+              <a:t> </a:t>
+            </a:r>
+            <a:r>
+              <a:rPr lang="de-CH" dirty="0">
+                <a:solidFill>
+                  <a:srgbClr val="CE9178"/>
+                </a:solidFill>
+                <a:latin typeface="Consolas" panose="020B0609020204030204" pitchFamily="49" charset="0"/>
+              </a:rPr>
+              <a:t>"LOGIN"</a:t>
+            </a:r>
+            <a:r>
+              <a:rPr lang="de-CH" dirty="0">
+                <a:solidFill>
+                  <a:srgbClr val="D4D4D4"/>
+                </a:solidFill>
+                <a:latin typeface="Consolas" panose="020B0609020204030204" pitchFamily="49" charset="0"/>
+              </a:rPr>
+              <a:t>:</a:t>
+            </a:r>
+          </a:p>
+          <a:p>
+            <a:r>
+              <a:rPr lang="de-CH" dirty="0">
+                <a:solidFill>
+                  <a:srgbClr val="4EC9B0"/>
+                </a:solidFill>
+                <a:latin typeface="Consolas" panose="020B0609020204030204" pitchFamily="49" charset="0"/>
+              </a:rPr>
+              <a:t>      console</a:t>
+            </a:r>
+            <a:r>
+              <a:rPr lang="de-CH" dirty="0">
+                <a:solidFill>
+                  <a:srgbClr val="D4D4D4"/>
+                </a:solidFill>
+                <a:latin typeface="Consolas" panose="020B0609020204030204" pitchFamily="49" charset="0"/>
+              </a:rPr>
+              <a:t>.</a:t>
+            </a:r>
+            <a:r>
+              <a:rPr lang="de-CH" dirty="0">
+                <a:solidFill>
+                  <a:srgbClr val="DCDCAA"/>
+                </a:solidFill>
+                <a:latin typeface="Consolas" panose="020B0609020204030204" pitchFamily="49" charset="0"/>
+              </a:rPr>
+              <a:t>log</a:t>
+            </a:r>
+            <a:r>
+              <a:rPr lang="de-CH" dirty="0">
+                <a:solidFill>
+                  <a:srgbClr val="D4D4D4"/>
+                </a:solidFill>
+                <a:latin typeface="Consolas" panose="020B0609020204030204" pitchFamily="49" charset="0"/>
+              </a:rPr>
+              <a:t>(</a:t>
+            </a:r>
+            <a:r>
+              <a:rPr lang="de-CH" dirty="0">
+                <a:solidFill>
+                  <a:srgbClr val="9CDCFE"/>
+                </a:solidFill>
+                <a:latin typeface="Consolas" panose="020B0609020204030204" pitchFamily="49" charset="0"/>
+              </a:rPr>
+              <a:t>action</a:t>
+            </a:r>
+            <a:r>
+              <a:rPr lang="de-CH" dirty="0">
+                <a:solidFill>
+                  <a:srgbClr val="D4D4D4"/>
+                </a:solidFill>
+                <a:latin typeface="Consolas" panose="020B0609020204030204" pitchFamily="49" charset="0"/>
+              </a:rPr>
+              <a:t>.</a:t>
+            </a:r>
+            <a:r>
+              <a:rPr lang="de-CH" dirty="0">
+                <a:solidFill>
+                  <a:srgbClr val="9CDCFE"/>
+                </a:solidFill>
+                <a:latin typeface="Consolas" panose="020B0609020204030204" pitchFamily="49" charset="0"/>
+              </a:rPr>
+              <a:t>name</a:t>
+            </a:r>
+            <a:r>
+              <a:rPr lang="de-CH" dirty="0">
+                <a:solidFill>
+                  <a:srgbClr val="D4D4D4"/>
+                </a:solidFill>
+                <a:latin typeface="Consolas" panose="020B0609020204030204" pitchFamily="49" charset="0"/>
+              </a:rPr>
+              <a:t> + </a:t>
+            </a:r>
+            <a:r>
+              <a:rPr lang="de-CH" dirty="0">
+                <a:solidFill>
+                  <a:srgbClr val="CE9178"/>
+                </a:solidFill>
+                <a:latin typeface="Consolas" panose="020B0609020204030204" pitchFamily="49" charset="0"/>
+              </a:rPr>
+              <a:t>" </a:t>
+            </a:r>
+            <a:r>
+              <a:rPr lang="de-CH" dirty="0" err="1">
+                <a:solidFill>
+                  <a:srgbClr val="CE9178"/>
+                </a:solidFill>
+                <a:latin typeface="Consolas" panose="020B0609020204030204" pitchFamily="49" charset="0"/>
+              </a:rPr>
+              <a:t>logged</a:t>
+            </a:r>
+            <a:r>
+              <a:rPr lang="de-CH" dirty="0">
+                <a:solidFill>
+                  <a:srgbClr val="CE9178"/>
+                </a:solidFill>
+                <a:latin typeface="Consolas" panose="020B0609020204030204" pitchFamily="49" charset="0"/>
+              </a:rPr>
+              <a:t> in"</a:t>
+            </a:r>
+            <a:r>
+              <a:rPr lang="de-CH" dirty="0">
+                <a:solidFill>
+                  <a:srgbClr val="D4D4D4"/>
+                </a:solidFill>
+                <a:latin typeface="Consolas" panose="020B0609020204030204" pitchFamily="49" charset="0"/>
+              </a:rPr>
+              <a:t>);</a:t>
+            </a:r>
+          </a:p>
+          <a:p>
+            <a:r>
+              <a:rPr lang="de-CH" dirty="0">
+                <a:solidFill>
+                  <a:srgbClr val="C586C0"/>
+                </a:solidFill>
+                <a:latin typeface="Consolas" panose="020B0609020204030204" pitchFamily="49" charset="0"/>
+              </a:rPr>
+              <a:t>      </a:t>
+            </a:r>
+            <a:r>
+              <a:rPr lang="de-CH" dirty="0" err="1">
+                <a:solidFill>
+                  <a:srgbClr val="C586C0"/>
+                </a:solidFill>
+                <a:latin typeface="Consolas" panose="020B0609020204030204" pitchFamily="49" charset="0"/>
+              </a:rPr>
+              <a:t>return</a:t>
+            </a:r>
+            <a:r>
+              <a:rPr lang="de-CH" dirty="0">
+                <a:solidFill>
+                  <a:srgbClr val="D4D4D4"/>
+                </a:solidFill>
+                <a:latin typeface="Consolas" panose="020B0609020204030204" pitchFamily="49" charset="0"/>
+              </a:rPr>
+              <a:t> </a:t>
+            </a:r>
+            <a:r>
+              <a:rPr lang="de-CH" dirty="0">
+                <a:solidFill>
+                  <a:srgbClr val="CE9178"/>
+                </a:solidFill>
+                <a:latin typeface="Consolas" panose="020B0609020204030204" pitchFamily="49" charset="0"/>
+              </a:rPr>
+              <a:t>"</a:t>
+            </a:r>
+            <a:r>
+              <a:rPr lang="de-CH" dirty="0" err="1">
+                <a:solidFill>
+                  <a:srgbClr val="CE9178"/>
+                </a:solidFill>
+                <a:latin typeface="Consolas" panose="020B0609020204030204" pitchFamily="49" charset="0"/>
+              </a:rPr>
+              <a:t>Logged</a:t>
+            </a:r>
+            <a:r>
+              <a:rPr lang="de-CH" dirty="0">
+                <a:solidFill>
+                  <a:srgbClr val="CE9178"/>
+                </a:solidFill>
+                <a:latin typeface="Consolas" panose="020B0609020204030204" pitchFamily="49" charset="0"/>
+              </a:rPr>
+              <a:t> In" </a:t>
+            </a:r>
+            <a:endParaRPr lang="de-CH" dirty="0">
+              <a:solidFill>
+                <a:srgbClr val="D4D4D4"/>
+              </a:solidFill>
+              <a:latin typeface="Consolas" panose="020B0609020204030204" pitchFamily="49" charset="0"/>
+            </a:endParaRPr>
+          </a:p>
+          <a:p>
+            <a:r>
+              <a:rPr lang="de-CH" dirty="0">
+                <a:solidFill>
+                  <a:srgbClr val="C586C0"/>
+                </a:solidFill>
+                <a:latin typeface="Consolas" panose="020B0609020204030204" pitchFamily="49" charset="0"/>
+              </a:rPr>
+              <a:t>    </a:t>
+            </a:r>
+            <a:r>
+              <a:rPr lang="de-CH" dirty="0" err="1">
+                <a:solidFill>
+                  <a:srgbClr val="C586C0"/>
+                </a:solidFill>
+                <a:latin typeface="Consolas" panose="020B0609020204030204" pitchFamily="49" charset="0"/>
+              </a:rPr>
+              <a:t>default</a:t>
+            </a:r>
+            <a:r>
+              <a:rPr lang="de-CH" dirty="0">
+                <a:solidFill>
+                  <a:srgbClr val="D4D4D4"/>
+                </a:solidFill>
+                <a:latin typeface="Consolas" panose="020B0609020204030204" pitchFamily="49" charset="0"/>
+              </a:rPr>
+              <a:t>:</a:t>
+            </a:r>
+          </a:p>
+          <a:p>
+            <a:r>
+              <a:rPr lang="de-CH" dirty="0">
+                <a:solidFill>
+                  <a:srgbClr val="4EC9B0"/>
+                </a:solidFill>
+                <a:latin typeface="Consolas" panose="020B0609020204030204" pitchFamily="49" charset="0"/>
+              </a:rPr>
+              <a:t>      console</a:t>
+            </a:r>
+            <a:r>
+              <a:rPr lang="de-CH" dirty="0">
+                <a:solidFill>
+                  <a:srgbClr val="D4D4D4"/>
+                </a:solidFill>
+                <a:latin typeface="Consolas" panose="020B0609020204030204" pitchFamily="49" charset="0"/>
+              </a:rPr>
+              <a:t>.</a:t>
+            </a:r>
+            <a:r>
+              <a:rPr lang="de-CH" dirty="0">
+                <a:solidFill>
+                  <a:srgbClr val="DCDCAA"/>
+                </a:solidFill>
+                <a:latin typeface="Consolas" panose="020B0609020204030204" pitchFamily="49" charset="0"/>
+              </a:rPr>
+              <a:t>log</a:t>
+            </a:r>
+            <a:r>
+              <a:rPr lang="de-CH" dirty="0">
+                <a:solidFill>
+                  <a:srgbClr val="D4D4D4"/>
+                </a:solidFill>
+                <a:latin typeface="Consolas" panose="020B0609020204030204" pitchFamily="49" charset="0"/>
+              </a:rPr>
+              <a:t>(</a:t>
+            </a:r>
+            <a:r>
+              <a:rPr lang="de-CH" dirty="0">
+                <a:solidFill>
+                  <a:srgbClr val="CE9178"/>
+                </a:solidFill>
+                <a:latin typeface="Consolas" panose="020B0609020204030204" pitchFamily="49" charset="0"/>
+              </a:rPr>
+              <a:t>"WTF"</a:t>
+            </a:r>
+            <a:r>
+              <a:rPr lang="de-CH" dirty="0">
+                <a:solidFill>
+                  <a:srgbClr val="D4D4D4"/>
+                </a:solidFill>
+                <a:latin typeface="Consolas" panose="020B0609020204030204" pitchFamily="49" charset="0"/>
+              </a:rPr>
+              <a:t>);</a:t>
+            </a:r>
+          </a:p>
+          <a:p>
+            <a:r>
+              <a:rPr lang="de-CH" dirty="0">
+                <a:solidFill>
+                  <a:srgbClr val="D4D4D4"/>
+                </a:solidFill>
+                <a:latin typeface="Consolas" panose="020B0609020204030204" pitchFamily="49" charset="0"/>
+              </a:rPr>
+              <a:t>  }</a:t>
+            </a:r>
+          </a:p>
+          <a:p>
+            <a:r>
+              <a:rPr lang="de-CH" dirty="0">
+                <a:solidFill>
+                  <a:srgbClr val="D4D4D4"/>
+                </a:solidFill>
+                <a:latin typeface="Consolas" panose="020B0609020204030204" pitchFamily="49" charset="0"/>
+              </a:rPr>
+              <a:t>}</a:t>
+            </a:r>
+          </a:p>
+        </p:txBody>
+      </p:sp>
+      <p:sp>
+        <p:nvSpPr>
+          <p:cNvPr id="5" name="Speech Bubble: Oval 4">
+            <a:extLst>
+              <a:ext uri="{FF2B5EF4-FFF2-40B4-BE49-F238E27FC236}">
+                <a16:creationId xmlns:a16="http://schemas.microsoft.com/office/drawing/2014/main" id="{005C7F54-66F7-43AD-83C4-8DA23313D52E}"/>
+              </a:ext>
+            </a:extLst>
+          </p:cNvPr>
+          <p:cNvSpPr/>
+          <p:nvPr/>
+        </p:nvSpPr>
+        <p:spPr>
+          <a:xfrm>
+            <a:off x="7251404" y="2089298"/>
+            <a:ext cx="4720856" cy="1961707"/>
+          </a:xfrm>
+          <a:prstGeom prst="wedgeEllipseCallout">
+            <a:avLst>
+              <a:gd name="adj1" fmla="val -122983"/>
+              <a:gd name="adj2" fmla="val 44659"/>
+            </a:avLst>
+          </a:prstGeom>
+          <a:solidFill>
+            <a:schemeClr val="bg1">
+              <a:lumMod val="95000"/>
+            </a:schemeClr>
+          </a:solidFill>
+          <a:ln w="76200">
+            <a:noFill/>
+          </a:ln>
+        </p:spPr>
+        <p:style>
+          <a:lnRef idx="2">
+            <a:schemeClr val="accent1">
+              <a:shade val="50000"/>
+            </a:schemeClr>
+          </a:lnRef>
+          <a:fillRef idx="1">
+            <a:schemeClr val="accent1"/>
+          </a:fillRef>
+          <a:effectRef idx="0">
+            <a:schemeClr val="accent1"/>
+          </a:effectRef>
+          <a:fontRef idx="minor">
+            <a:schemeClr val="lt1"/>
+          </a:fontRef>
+        </p:style>
+        <p:txBody>
+          <a:bodyPr rot="0" spcFirstLastPara="0" vertOverflow="overflow" horzOverflow="overflow" vert="horz" wrap="square" lIns="91440" tIns="45720" rIns="91440" bIns="45720" numCol="1" spcCol="0" rtlCol="0" fromWordArt="0" anchor="ctr" anchorCtr="0" forceAA="0" compatLnSpc="1">
+            <a:prstTxWarp prst="textNoShape">
+              <a:avLst/>
+            </a:prstTxWarp>
+            <a:noAutofit/>
+          </a:bodyPr>
+          <a:lstStyle/>
+          <a:p>
+            <a:pPr algn="ctr"/>
+            <a:r>
+              <a:rPr lang="en-GB" sz="3200" dirty="0">
+                <a:ln w="0"/>
+                <a:solidFill>
+                  <a:schemeClr val="tx1"/>
+                </a:solidFill>
+                <a:effectLst>
+                  <a:outerShdw blurRad="38100" dist="19050" dir="2700000" algn="tl" rotWithShape="0">
+                    <a:schemeClr val="dk1">
+                      <a:alpha val="40000"/>
+                    </a:schemeClr>
+                  </a:outerShdw>
+                </a:effectLst>
+              </a:rPr>
+              <a:t>Property “name” can be safely accessed here</a:t>
+            </a:r>
           </a:p>
         </p:txBody>
       </p:sp>
     </p:spTree>
     <p:extLst>
       <p:ext uri="{BB962C8B-B14F-4D97-AF65-F5344CB8AC3E}">
-        <p14:creationId xmlns:p14="http://schemas.microsoft.com/office/powerpoint/2010/main" val="2783837660"/>
+        <p14:creationId xmlns:p14="http://schemas.microsoft.com/office/powerpoint/2010/main" val="851654371"/>
       </p:ext>
     </p:extLst>
   </p:cSld>
   <p:clrMapOvr>
     <a:masterClrMapping/>
   </p:clrMapOvr>
+  <p:timing>
+    <p:tnLst>
+      <p:par>
+        <p:cTn id="1" dur="indefinite" restart="never" nodeType="tmRoot">
+          <p:childTnLst>
+            <p:seq concurrent="1" nextAc="seek">
+              <p:cTn id="2" dur="indefinite" nodeType="mainSeq">
+                <p:childTnLst>
+                  <p:par>
+                    <p:cTn id="3" fill="hold">
+                      <p:stCondLst>
+                        <p:cond delay="indefinite"/>
+                      </p:stCondLst>
+                      <p:childTnLst>
+                        <p:par>
+                          <p:cTn id="4" fill="hold">
+                            <p:stCondLst>
+                              <p:cond delay="0"/>
+                            </p:stCondLst>
+                            <p:childTnLst>
+                              <p:par>
+                                <p:cTn id="5" presetID="1" presetClass="entr" presetSubtype="0" fill="hold" grpId="0" nodeType="clickEffect">
+                                  <p:stCondLst>
+                                    <p:cond delay="0"/>
+                                  </p:stCondLst>
+                                  <p:childTnLst>
+                                    <p:set>
+                                      <p:cBhvr>
+                                        <p:cTn id="6" dur="1" fill="hold">
+                                          <p:stCondLst>
+                                            <p:cond delay="0"/>
+                                          </p:stCondLst>
+                                        </p:cTn>
+                                        <p:tgtEl>
+                                          <p:spTgt spid="5"/>
+                                        </p:tgtEl>
+                                        <p:attrNameLst>
+                                          <p:attrName>style.visibility</p:attrName>
+                                        </p:attrNameLst>
+                                      </p:cBhvr>
+                                      <p:to>
+                                        <p:strVal val="visible"/>
+                                      </p:to>
+                                    </p:set>
+                                  </p:childTnLst>
+                                </p:cTn>
+                              </p:par>
+                            </p:childTnLst>
+                          </p:cTn>
+                        </p:par>
+                      </p:childTnLst>
+                    </p:cTn>
+                  </p:par>
+                </p:childTnLst>
+              </p:cTn>
+              <p:prevCondLst>
+                <p:cond evt="onPrev" delay="0">
+                  <p:tgtEl>
+                    <p:sldTgt/>
+                  </p:tgtEl>
+                </p:cond>
+              </p:prevCondLst>
+              <p:nextCondLst>
+                <p:cond evt="onNext" delay="0">
+                  <p:tgtEl>
+                    <p:sldTgt/>
+                  </p:tgtEl>
+                </p:cond>
+              </p:nextCondLst>
+            </p:seq>
+          </p:childTnLst>
+        </p:cTn>
+      </p:par>
+    </p:tnLst>
+    <p:bldLst>
+      <p:bldP spid="5" grpId="0" animBg="1"/>
+    </p:bldLst>
+  </p:timing>
 </p:sld>
 </file>
 
 <file path=ppt/slides/slide21.xml><?xml version="1.0" encoding="utf-8"?>
+<p:sld xmlns:a="http://schemas.openxmlformats.org/drawingml/2006/main" xmlns:r="http://schemas.openxmlformats.org/officeDocument/2006/relationships" xmlns:p="http://schemas.openxmlformats.org/presentationml/2006/main">
+  <p:cSld>
+    <p:spTree>
+      <p:nvGrpSpPr>
+        <p:cNvPr id="1" name=""/>
+        <p:cNvGrpSpPr/>
+        <p:nvPr/>
+      </p:nvGrpSpPr>
+      <p:grpSpPr>
+        <a:xfrm>
+          <a:off x="0" y="0"/>
+          <a:ext cx="0" cy="0"/>
+          <a:chOff x="0" y="0"/>
+          <a:chExt cx="0" cy="0"/>
+        </a:xfrm>
+      </p:grpSpPr>
+      <p:sp>
+        <p:nvSpPr>
+          <p:cNvPr id="2" name="Title 1">
+            <a:extLst>
+              <a:ext uri="{FF2B5EF4-FFF2-40B4-BE49-F238E27FC236}">
+                <a16:creationId xmlns:a16="http://schemas.microsoft.com/office/drawing/2014/main" id="{881C8C4A-DA34-4933-BE30-83EDE40DD3F3}"/>
+              </a:ext>
+            </a:extLst>
+          </p:cNvPr>
+          <p:cNvSpPr>
+            <a:spLocks noGrp="1"/>
+          </p:cNvSpPr>
+          <p:nvPr>
+            <p:ph type="title"/>
+          </p:nvPr>
+        </p:nvSpPr>
+        <p:spPr/>
+        <p:txBody>
+          <a:bodyPr/>
+          <a:lstStyle/>
+          <a:p>
+            <a:r>
+              <a:rPr lang="en-GB" dirty="0"/>
+              <a:t>Example of using Union Types</a:t>
+            </a:r>
+          </a:p>
+        </p:txBody>
+      </p:sp>
+      <p:sp>
+        <p:nvSpPr>
+          <p:cNvPr id="3" name="Content Placeholder 2">
+            <a:extLst>
+              <a:ext uri="{FF2B5EF4-FFF2-40B4-BE49-F238E27FC236}">
+                <a16:creationId xmlns:a16="http://schemas.microsoft.com/office/drawing/2014/main" id="{DD7A9F0C-3198-4D5F-B54B-3C995CC9FC18}"/>
+              </a:ext>
+            </a:extLst>
+          </p:cNvPr>
+          <p:cNvSpPr>
+            <a:spLocks noGrp="1"/>
+          </p:cNvSpPr>
+          <p:nvPr>
+            <p:ph idx="1"/>
+          </p:nvPr>
+        </p:nvSpPr>
+        <p:spPr/>
+        <p:txBody>
+          <a:bodyPr/>
+          <a:lstStyle/>
+          <a:p>
+            <a:pPr marL="0" indent="0">
+              <a:buNone/>
+            </a:pPr>
+            <a:endParaRPr lang="en-GB" dirty="0"/>
+          </a:p>
+        </p:txBody>
+      </p:sp>
+      <p:sp>
+        <p:nvSpPr>
+          <p:cNvPr id="4" name="Rectangle 3">
+            <a:extLst>
+              <a:ext uri="{FF2B5EF4-FFF2-40B4-BE49-F238E27FC236}">
+                <a16:creationId xmlns:a16="http://schemas.microsoft.com/office/drawing/2014/main" id="{0217E739-B41C-417F-B235-6F10CF968E55}"/>
+              </a:ext>
+            </a:extLst>
+          </p:cNvPr>
+          <p:cNvSpPr/>
+          <p:nvPr/>
+        </p:nvSpPr>
+        <p:spPr>
+          <a:xfrm>
+            <a:off x="268308" y="1184858"/>
+            <a:ext cx="11655379" cy="4801314"/>
+          </a:xfrm>
+          <a:prstGeom prst="rect">
+            <a:avLst/>
+          </a:prstGeom>
+          <a:solidFill>
+            <a:schemeClr val="tx1">
+              <a:lumMod val="75000"/>
+              <a:lumOff val="25000"/>
+            </a:schemeClr>
+          </a:solidFill>
+          <a:ln>
+            <a:noFill/>
+          </a:ln>
+        </p:spPr>
+        <p:txBody>
+          <a:bodyPr wrap="square">
+            <a:spAutoFit/>
+          </a:bodyPr>
+          <a:lstStyle/>
+          <a:p>
+            <a:r>
+              <a:rPr lang="de-CH" dirty="0">
+                <a:solidFill>
+                  <a:srgbClr val="569CD6"/>
+                </a:solidFill>
+                <a:latin typeface="Consolas" panose="020B0609020204030204" pitchFamily="49" charset="0"/>
+              </a:rPr>
+              <a:t>type</a:t>
+            </a:r>
+            <a:r>
+              <a:rPr lang="de-CH" dirty="0">
+                <a:solidFill>
+                  <a:srgbClr val="D4D4D4"/>
+                </a:solidFill>
+                <a:latin typeface="Consolas" panose="020B0609020204030204" pitchFamily="49" charset="0"/>
+              </a:rPr>
+              <a:t> </a:t>
+            </a:r>
+            <a:r>
+              <a:rPr lang="de-CH" dirty="0" err="1">
+                <a:solidFill>
+                  <a:srgbClr val="4EC9B0"/>
+                </a:solidFill>
+                <a:latin typeface="Consolas" panose="020B0609020204030204" pitchFamily="49" charset="0"/>
+              </a:rPr>
+              <a:t>InitAction</a:t>
+            </a:r>
+            <a:r>
+              <a:rPr lang="de-CH" dirty="0">
+                <a:solidFill>
+                  <a:srgbClr val="D4D4D4"/>
+                </a:solidFill>
+                <a:latin typeface="Consolas" panose="020B0609020204030204" pitchFamily="49" charset="0"/>
+              </a:rPr>
+              <a:t> = { </a:t>
+            </a:r>
+            <a:r>
+              <a:rPr lang="de-CH" dirty="0">
+                <a:solidFill>
+                  <a:srgbClr val="9CDCFE"/>
+                </a:solidFill>
+                <a:latin typeface="Consolas" panose="020B0609020204030204" pitchFamily="49" charset="0"/>
+              </a:rPr>
+              <a:t>type</a:t>
+            </a:r>
+            <a:r>
+              <a:rPr lang="de-CH" dirty="0">
+                <a:solidFill>
+                  <a:srgbClr val="D4D4D4"/>
+                </a:solidFill>
+                <a:latin typeface="Consolas" panose="020B0609020204030204" pitchFamily="49" charset="0"/>
+              </a:rPr>
+              <a:t>: </a:t>
+            </a:r>
+            <a:r>
+              <a:rPr lang="de-CH" dirty="0">
+                <a:solidFill>
+                  <a:srgbClr val="CE9178"/>
+                </a:solidFill>
+                <a:latin typeface="Consolas" panose="020B0609020204030204" pitchFamily="49" charset="0"/>
+              </a:rPr>
+              <a:t>"INIT"</a:t>
+            </a:r>
+            <a:r>
+              <a:rPr lang="de-CH" dirty="0">
+                <a:solidFill>
+                  <a:srgbClr val="D4D4D4"/>
+                </a:solidFill>
+                <a:latin typeface="Consolas" panose="020B0609020204030204" pitchFamily="49" charset="0"/>
+              </a:rPr>
+              <a:t> }</a:t>
+            </a:r>
+          </a:p>
+          <a:p>
+            <a:r>
+              <a:rPr lang="de-CH" dirty="0">
+                <a:solidFill>
+                  <a:srgbClr val="569CD6"/>
+                </a:solidFill>
+                <a:latin typeface="Consolas" panose="020B0609020204030204" pitchFamily="49" charset="0"/>
+              </a:rPr>
+              <a:t>type</a:t>
+            </a:r>
+            <a:r>
+              <a:rPr lang="de-CH" dirty="0">
+                <a:solidFill>
+                  <a:srgbClr val="D4D4D4"/>
+                </a:solidFill>
+                <a:latin typeface="Consolas" panose="020B0609020204030204" pitchFamily="49" charset="0"/>
+              </a:rPr>
+              <a:t> </a:t>
+            </a:r>
+            <a:r>
+              <a:rPr lang="de-CH" dirty="0" err="1">
+                <a:solidFill>
+                  <a:srgbClr val="4EC9B0"/>
+                </a:solidFill>
+                <a:latin typeface="Consolas" panose="020B0609020204030204" pitchFamily="49" charset="0"/>
+              </a:rPr>
+              <a:t>LoginAction</a:t>
+            </a:r>
+            <a:r>
+              <a:rPr lang="de-CH" dirty="0">
+                <a:solidFill>
+                  <a:srgbClr val="D4D4D4"/>
+                </a:solidFill>
+                <a:latin typeface="Consolas" panose="020B0609020204030204" pitchFamily="49" charset="0"/>
+              </a:rPr>
+              <a:t> = { </a:t>
+            </a:r>
+            <a:r>
+              <a:rPr lang="de-CH" dirty="0">
+                <a:solidFill>
+                  <a:srgbClr val="9CDCFE"/>
+                </a:solidFill>
+                <a:latin typeface="Consolas" panose="020B0609020204030204" pitchFamily="49" charset="0"/>
+              </a:rPr>
+              <a:t>type</a:t>
+            </a:r>
+            <a:r>
+              <a:rPr lang="de-CH" dirty="0">
+                <a:solidFill>
+                  <a:srgbClr val="D4D4D4"/>
+                </a:solidFill>
+                <a:latin typeface="Consolas" panose="020B0609020204030204" pitchFamily="49" charset="0"/>
+              </a:rPr>
+              <a:t>: </a:t>
+            </a:r>
+            <a:r>
+              <a:rPr lang="de-CH" dirty="0">
+                <a:solidFill>
+                  <a:srgbClr val="CE9178"/>
+                </a:solidFill>
+                <a:latin typeface="Consolas" panose="020B0609020204030204" pitchFamily="49" charset="0"/>
+              </a:rPr>
+              <a:t>"LOGIN"</a:t>
+            </a:r>
+            <a:r>
+              <a:rPr lang="de-CH" dirty="0">
+                <a:solidFill>
+                  <a:srgbClr val="D4D4D4"/>
+                </a:solidFill>
+                <a:latin typeface="Consolas" panose="020B0609020204030204" pitchFamily="49" charset="0"/>
+              </a:rPr>
+              <a:t>, </a:t>
+            </a:r>
+            <a:r>
+              <a:rPr lang="de-CH" dirty="0" err="1">
+                <a:solidFill>
+                  <a:srgbClr val="9CDCFE"/>
+                </a:solidFill>
+                <a:latin typeface="Consolas" panose="020B0609020204030204" pitchFamily="49" charset="0"/>
+              </a:rPr>
+              <a:t>name</a:t>
+            </a:r>
+            <a:r>
+              <a:rPr lang="de-CH" dirty="0">
+                <a:solidFill>
+                  <a:srgbClr val="D4D4D4"/>
+                </a:solidFill>
+                <a:latin typeface="Consolas" panose="020B0609020204030204" pitchFamily="49" charset="0"/>
+              </a:rPr>
+              <a:t>: </a:t>
+            </a:r>
+            <a:r>
+              <a:rPr lang="de-CH" dirty="0" err="1">
+                <a:solidFill>
+                  <a:srgbClr val="4EC9B0"/>
+                </a:solidFill>
+                <a:latin typeface="Consolas" panose="020B0609020204030204" pitchFamily="49" charset="0"/>
+              </a:rPr>
+              <a:t>string</a:t>
+            </a:r>
+            <a:r>
+              <a:rPr lang="de-CH" dirty="0">
+                <a:solidFill>
+                  <a:srgbClr val="D4D4D4"/>
+                </a:solidFill>
+                <a:latin typeface="Consolas" panose="020B0609020204030204" pitchFamily="49" charset="0"/>
+              </a:rPr>
+              <a:t>, </a:t>
+            </a:r>
+            <a:r>
+              <a:rPr lang="de-CH" dirty="0" err="1">
+                <a:solidFill>
+                  <a:srgbClr val="9CDCFE"/>
+                </a:solidFill>
+                <a:latin typeface="Consolas" panose="020B0609020204030204" pitchFamily="49" charset="0"/>
+              </a:rPr>
+              <a:t>password</a:t>
+            </a:r>
+            <a:r>
+              <a:rPr lang="de-CH" dirty="0">
+                <a:solidFill>
+                  <a:srgbClr val="D4D4D4"/>
+                </a:solidFill>
+                <a:latin typeface="Consolas" panose="020B0609020204030204" pitchFamily="49" charset="0"/>
+              </a:rPr>
+              <a:t>: </a:t>
+            </a:r>
+            <a:r>
+              <a:rPr lang="de-CH" dirty="0" err="1">
+                <a:solidFill>
+                  <a:srgbClr val="4EC9B0"/>
+                </a:solidFill>
+                <a:latin typeface="Consolas" panose="020B0609020204030204" pitchFamily="49" charset="0"/>
+              </a:rPr>
+              <a:t>string</a:t>
+            </a:r>
+            <a:r>
+              <a:rPr lang="de-CH" dirty="0">
+                <a:solidFill>
+                  <a:srgbClr val="D4D4D4"/>
+                </a:solidFill>
+                <a:latin typeface="Consolas" panose="020B0609020204030204" pitchFamily="49" charset="0"/>
+              </a:rPr>
+              <a:t> }</a:t>
+            </a:r>
+          </a:p>
+          <a:p>
+            <a:r>
+              <a:rPr lang="de-CH" dirty="0">
+                <a:solidFill>
+                  <a:srgbClr val="569CD6"/>
+                </a:solidFill>
+                <a:latin typeface="Consolas" panose="020B0609020204030204" pitchFamily="49" charset="0"/>
+              </a:rPr>
+              <a:t>type</a:t>
+            </a:r>
+            <a:r>
+              <a:rPr lang="de-CH" dirty="0">
+                <a:solidFill>
+                  <a:srgbClr val="D4D4D4"/>
+                </a:solidFill>
+                <a:latin typeface="Consolas" panose="020B0609020204030204" pitchFamily="49" charset="0"/>
+              </a:rPr>
+              <a:t> </a:t>
+            </a:r>
+            <a:r>
+              <a:rPr lang="de-CH" dirty="0" err="1">
+                <a:solidFill>
+                  <a:srgbClr val="4EC9B0"/>
+                </a:solidFill>
+                <a:latin typeface="Consolas" panose="020B0609020204030204" pitchFamily="49" charset="0"/>
+              </a:rPr>
+              <a:t>LogOutAction</a:t>
+            </a:r>
+            <a:r>
+              <a:rPr lang="de-CH" dirty="0">
+                <a:solidFill>
+                  <a:srgbClr val="D4D4D4"/>
+                </a:solidFill>
+                <a:latin typeface="Consolas" panose="020B0609020204030204" pitchFamily="49" charset="0"/>
+              </a:rPr>
+              <a:t> = { </a:t>
+            </a:r>
+            <a:r>
+              <a:rPr lang="de-CH" dirty="0">
+                <a:solidFill>
+                  <a:srgbClr val="9CDCFE"/>
+                </a:solidFill>
+                <a:latin typeface="Consolas" panose="020B0609020204030204" pitchFamily="49" charset="0"/>
+              </a:rPr>
+              <a:t>type</a:t>
+            </a:r>
+            <a:r>
+              <a:rPr lang="de-CH" dirty="0">
+                <a:solidFill>
+                  <a:srgbClr val="D4D4D4"/>
+                </a:solidFill>
+                <a:latin typeface="Consolas" panose="020B0609020204030204" pitchFamily="49" charset="0"/>
+              </a:rPr>
+              <a:t>: </a:t>
+            </a:r>
+            <a:r>
+              <a:rPr lang="de-CH" dirty="0">
+                <a:solidFill>
+                  <a:srgbClr val="CE9178"/>
+                </a:solidFill>
+                <a:latin typeface="Consolas" panose="020B0609020204030204" pitchFamily="49" charset="0"/>
+              </a:rPr>
+              <a:t>"LOGOUT"</a:t>
+            </a:r>
+            <a:r>
+              <a:rPr lang="de-CH" dirty="0">
+                <a:solidFill>
+                  <a:srgbClr val="D4D4D4"/>
+                </a:solidFill>
+                <a:latin typeface="Consolas" panose="020B0609020204030204" pitchFamily="49" charset="0"/>
+              </a:rPr>
+              <a:t> }</a:t>
+            </a:r>
+          </a:p>
+          <a:p>
+            <a:br>
+              <a:rPr lang="de-CH" dirty="0">
+                <a:solidFill>
+                  <a:srgbClr val="D4D4D4"/>
+                </a:solidFill>
+                <a:latin typeface="Consolas" panose="020B0609020204030204" pitchFamily="49" charset="0"/>
+              </a:rPr>
+            </a:br>
+            <a:r>
+              <a:rPr lang="de-CH" dirty="0">
+                <a:solidFill>
+                  <a:srgbClr val="569CD6"/>
+                </a:solidFill>
+                <a:latin typeface="Consolas" panose="020B0609020204030204" pitchFamily="49" charset="0"/>
+              </a:rPr>
+              <a:t>type</a:t>
+            </a:r>
+            <a:r>
+              <a:rPr lang="de-CH" dirty="0">
+                <a:solidFill>
+                  <a:srgbClr val="D4D4D4"/>
+                </a:solidFill>
+                <a:latin typeface="Consolas" panose="020B0609020204030204" pitchFamily="49" charset="0"/>
+              </a:rPr>
+              <a:t> </a:t>
+            </a:r>
+            <a:r>
+              <a:rPr lang="de-CH" dirty="0">
+                <a:solidFill>
+                  <a:srgbClr val="4EC9B0"/>
+                </a:solidFill>
+                <a:latin typeface="Consolas" panose="020B0609020204030204" pitchFamily="49" charset="0"/>
+              </a:rPr>
+              <a:t>Actions</a:t>
+            </a:r>
+            <a:r>
+              <a:rPr lang="de-CH" dirty="0">
+                <a:solidFill>
+                  <a:srgbClr val="D4D4D4"/>
+                </a:solidFill>
+                <a:latin typeface="Consolas" panose="020B0609020204030204" pitchFamily="49" charset="0"/>
+              </a:rPr>
+              <a:t> = </a:t>
+            </a:r>
+            <a:r>
+              <a:rPr lang="de-CH" dirty="0" err="1">
+                <a:solidFill>
+                  <a:srgbClr val="4EC9B0"/>
+                </a:solidFill>
+                <a:latin typeface="Consolas" panose="020B0609020204030204" pitchFamily="49" charset="0"/>
+              </a:rPr>
+              <a:t>InitAction</a:t>
+            </a:r>
+            <a:r>
+              <a:rPr lang="de-CH" dirty="0">
+                <a:solidFill>
+                  <a:srgbClr val="D4D4D4"/>
+                </a:solidFill>
+                <a:latin typeface="Consolas" panose="020B0609020204030204" pitchFamily="49" charset="0"/>
+              </a:rPr>
+              <a:t> | </a:t>
+            </a:r>
+            <a:r>
+              <a:rPr lang="de-CH" dirty="0" err="1">
+                <a:solidFill>
+                  <a:srgbClr val="4EC9B0"/>
+                </a:solidFill>
+                <a:latin typeface="Consolas" panose="020B0609020204030204" pitchFamily="49" charset="0"/>
+              </a:rPr>
+              <a:t>LoginAction</a:t>
+            </a:r>
+            <a:r>
+              <a:rPr lang="de-CH" dirty="0">
+                <a:solidFill>
+                  <a:srgbClr val="D4D4D4"/>
+                </a:solidFill>
+                <a:latin typeface="Consolas" panose="020B0609020204030204" pitchFamily="49" charset="0"/>
+              </a:rPr>
+              <a:t> | </a:t>
+            </a:r>
+            <a:r>
+              <a:rPr lang="de-CH" dirty="0" err="1">
+                <a:solidFill>
+                  <a:srgbClr val="4EC9B0"/>
+                </a:solidFill>
+                <a:latin typeface="Consolas" panose="020B0609020204030204" pitchFamily="49" charset="0"/>
+              </a:rPr>
+              <a:t>LogOutAction</a:t>
+            </a:r>
+            <a:r>
+              <a:rPr lang="de-CH" dirty="0">
+                <a:solidFill>
+                  <a:srgbClr val="D4D4D4"/>
+                </a:solidFill>
+                <a:latin typeface="Consolas" panose="020B0609020204030204" pitchFamily="49" charset="0"/>
+              </a:rPr>
+              <a:t>;</a:t>
+            </a:r>
+          </a:p>
+          <a:p>
+            <a:br>
+              <a:rPr lang="de-CH" dirty="0">
+                <a:solidFill>
+                  <a:srgbClr val="D4D4D4"/>
+                </a:solidFill>
+                <a:latin typeface="Consolas" panose="020B0609020204030204" pitchFamily="49" charset="0"/>
+              </a:rPr>
+            </a:br>
+            <a:r>
+              <a:rPr lang="de-CH" dirty="0" err="1">
+                <a:solidFill>
+                  <a:srgbClr val="569CD6"/>
+                </a:solidFill>
+                <a:latin typeface="Consolas" panose="020B0609020204030204" pitchFamily="49" charset="0"/>
+              </a:rPr>
+              <a:t>function</a:t>
+            </a:r>
+            <a:r>
+              <a:rPr lang="de-CH" dirty="0">
+                <a:solidFill>
+                  <a:srgbClr val="D4D4D4"/>
+                </a:solidFill>
+                <a:latin typeface="Consolas" panose="020B0609020204030204" pitchFamily="49" charset="0"/>
+              </a:rPr>
+              <a:t> </a:t>
+            </a:r>
+            <a:r>
+              <a:rPr lang="de-CH" dirty="0" err="1">
+                <a:solidFill>
+                  <a:srgbClr val="DCDCAA"/>
+                </a:solidFill>
+                <a:latin typeface="Consolas" panose="020B0609020204030204" pitchFamily="49" charset="0"/>
+              </a:rPr>
+              <a:t>handleAction</a:t>
+            </a:r>
+            <a:r>
+              <a:rPr lang="de-CH" dirty="0">
+                <a:solidFill>
+                  <a:srgbClr val="D4D4D4"/>
+                </a:solidFill>
+                <a:latin typeface="Consolas" panose="020B0609020204030204" pitchFamily="49" charset="0"/>
+              </a:rPr>
+              <a:t>(</a:t>
+            </a:r>
+            <a:r>
+              <a:rPr lang="de-CH" dirty="0" err="1">
+                <a:solidFill>
+                  <a:srgbClr val="9CDCFE"/>
+                </a:solidFill>
+                <a:latin typeface="Consolas" panose="020B0609020204030204" pitchFamily="49" charset="0"/>
+              </a:rPr>
+              <a:t>action</a:t>
+            </a:r>
+            <a:r>
+              <a:rPr lang="de-CH" dirty="0">
+                <a:solidFill>
+                  <a:srgbClr val="D4D4D4"/>
+                </a:solidFill>
+                <a:latin typeface="Consolas" panose="020B0609020204030204" pitchFamily="49" charset="0"/>
+              </a:rPr>
+              <a:t>: </a:t>
+            </a:r>
+            <a:r>
+              <a:rPr lang="de-CH" dirty="0">
+                <a:solidFill>
+                  <a:srgbClr val="4EC9B0"/>
+                </a:solidFill>
+                <a:latin typeface="Consolas" panose="020B0609020204030204" pitchFamily="49" charset="0"/>
+              </a:rPr>
+              <a:t>Actions</a:t>
+            </a:r>
+            <a:r>
+              <a:rPr lang="de-CH" dirty="0">
+                <a:solidFill>
+                  <a:srgbClr val="D4D4D4"/>
+                </a:solidFill>
+                <a:latin typeface="Consolas" panose="020B0609020204030204" pitchFamily="49" charset="0"/>
+              </a:rPr>
+              <a:t>) {</a:t>
+            </a:r>
+          </a:p>
+          <a:p>
+            <a:r>
+              <a:rPr lang="de-CH" dirty="0">
+                <a:solidFill>
+                  <a:srgbClr val="C586C0"/>
+                </a:solidFill>
+                <a:latin typeface="Consolas" panose="020B0609020204030204" pitchFamily="49" charset="0"/>
+              </a:rPr>
+              <a:t>  switch</a:t>
+            </a:r>
+            <a:r>
+              <a:rPr lang="de-CH" dirty="0">
+                <a:solidFill>
+                  <a:srgbClr val="D4D4D4"/>
+                </a:solidFill>
+                <a:latin typeface="Consolas" panose="020B0609020204030204" pitchFamily="49" charset="0"/>
+              </a:rPr>
+              <a:t> (</a:t>
+            </a:r>
+            <a:r>
+              <a:rPr lang="de-CH" dirty="0" err="1">
+                <a:solidFill>
+                  <a:srgbClr val="9CDCFE"/>
+                </a:solidFill>
+                <a:latin typeface="Consolas" panose="020B0609020204030204" pitchFamily="49" charset="0"/>
+              </a:rPr>
+              <a:t>action</a:t>
+            </a:r>
+            <a:r>
+              <a:rPr lang="de-CH" dirty="0" err="1">
+                <a:solidFill>
+                  <a:srgbClr val="D4D4D4"/>
+                </a:solidFill>
+                <a:latin typeface="Consolas" panose="020B0609020204030204" pitchFamily="49" charset="0"/>
+              </a:rPr>
+              <a:t>.</a:t>
+            </a:r>
+            <a:r>
+              <a:rPr lang="de-CH" dirty="0" err="1">
+                <a:solidFill>
+                  <a:srgbClr val="9CDCFE"/>
+                </a:solidFill>
+                <a:latin typeface="Consolas" panose="020B0609020204030204" pitchFamily="49" charset="0"/>
+              </a:rPr>
+              <a:t>type</a:t>
+            </a:r>
+            <a:r>
+              <a:rPr lang="de-CH" dirty="0">
+                <a:solidFill>
+                  <a:srgbClr val="D4D4D4"/>
+                </a:solidFill>
+                <a:latin typeface="Consolas" panose="020B0609020204030204" pitchFamily="49" charset="0"/>
+              </a:rPr>
+              <a:t>) {</a:t>
+            </a:r>
+          </a:p>
+          <a:p>
+            <a:r>
+              <a:rPr lang="de-CH" dirty="0">
+                <a:solidFill>
+                  <a:srgbClr val="C586C0"/>
+                </a:solidFill>
+                <a:latin typeface="Consolas" panose="020B0609020204030204" pitchFamily="49" charset="0"/>
+              </a:rPr>
+              <a:t>    </a:t>
+            </a:r>
+            <a:r>
+              <a:rPr lang="de-CH" dirty="0" err="1">
+                <a:solidFill>
+                  <a:srgbClr val="C586C0"/>
+                </a:solidFill>
+                <a:latin typeface="Consolas" panose="020B0609020204030204" pitchFamily="49" charset="0"/>
+              </a:rPr>
+              <a:t>case</a:t>
+            </a:r>
+            <a:r>
+              <a:rPr lang="de-CH" dirty="0">
+                <a:solidFill>
+                  <a:srgbClr val="D4D4D4"/>
+                </a:solidFill>
+                <a:latin typeface="Consolas" panose="020B0609020204030204" pitchFamily="49" charset="0"/>
+              </a:rPr>
+              <a:t> </a:t>
+            </a:r>
+            <a:r>
+              <a:rPr lang="de-CH" dirty="0">
+                <a:solidFill>
+                  <a:srgbClr val="CE9178"/>
+                </a:solidFill>
+                <a:latin typeface="Consolas" panose="020B0609020204030204" pitchFamily="49" charset="0"/>
+              </a:rPr>
+              <a:t>"INIT"</a:t>
+            </a:r>
+            <a:r>
+              <a:rPr lang="de-CH" dirty="0">
+                <a:solidFill>
+                  <a:srgbClr val="D4D4D4"/>
+                </a:solidFill>
+                <a:latin typeface="Consolas" panose="020B0609020204030204" pitchFamily="49" charset="0"/>
+              </a:rPr>
+              <a:t>:</a:t>
+            </a:r>
+          </a:p>
+          <a:p>
+            <a:r>
+              <a:rPr lang="de-CH" dirty="0">
+                <a:solidFill>
+                  <a:srgbClr val="C586C0"/>
+                </a:solidFill>
+                <a:latin typeface="Consolas" panose="020B0609020204030204" pitchFamily="49" charset="0"/>
+              </a:rPr>
+              <a:t>      </a:t>
+            </a:r>
+            <a:r>
+              <a:rPr lang="de-CH" dirty="0" err="1">
+                <a:solidFill>
+                  <a:srgbClr val="C586C0"/>
+                </a:solidFill>
+                <a:latin typeface="Consolas" panose="020B0609020204030204" pitchFamily="49" charset="0"/>
+              </a:rPr>
+              <a:t>return</a:t>
+            </a:r>
+            <a:r>
+              <a:rPr lang="de-CH" dirty="0">
+                <a:solidFill>
+                  <a:srgbClr val="D4D4D4"/>
+                </a:solidFill>
+                <a:latin typeface="Consolas" panose="020B0609020204030204" pitchFamily="49" charset="0"/>
+              </a:rPr>
+              <a:t> </a:t>
+            </a:r>
+            <a:r>
+              <a:rPr lang="de-CH" dirty="0">
+                <a:solidFill>
+                  <a:srgbClr val="CE9178"/>
+                </a:solidFill>
+                <a:latin typeface="Consolas" panose="020B0609020204030204" pitchFamily="49" charset="0"/>
+              </a:rPr>
+              <a:t>"</a:t>
+            </a:r>
+            <a:r>
+              <a:rPr lang="de-CH" dirty="0" err="1">
+                <a:solidFill>
+                  <a:srgbClr val="CE9178"/>
+                </a:solidFill>
+                <a:latin typeface="Consolas" panose="020B0609020204030204" pitchFamily="49" charset="0"/>
+              </a:rPr>
+              <a:t>Initialized</a:t>
+            </a:r>
+            <a:r>
+              <a:rPr lang="de-CH" dirty="0">
+                <a:solidFill>
+                  <a:srgbClr val="CE9178"/>
+                </a:solidFill>
+                <a:latin typeface="Consolas" panose="020B0609020204030204" pitchFamily="49" charset="0"/>
+              </a:rPr>
+              <a:t>"</a:t>
+            </a:r>
+            <a:r>
+              <a:rPr lang="de-CH" dirty="0">
+                <a:solidFill>
+                  <a:srgbClr val="D4D4D4"/>
+                </a:solidFill>
+                <a:latin typeface="Consolas" panose="020B0609020204030204" pitchFamily="49" charset="0"/>
+              </a:rPr>
+              <a:t>;</a:t>
+            </a:r>
+          </a:p>
+          <a:p>
+            <a:r>
+              <a:rPr lang="de-CH" dirty="0">
+                <a:solidFill>
+                  <a:srgbClr val="C586C0"/>
+                </a:solidFill>
+                <a:latin typeface="Consolas" panose="020B0609020204030204" pitchFamily="49" charset="0"/>
+              </a:rPr>
+              <a:t>    </a:t>
+            </a:r>
+            <a:r>
+              <a:rPr lang="de-CH" dirty="0" err="1">
+                <a:solidFill>
+                  <a:srgbClr val="C586C0"/>
+                </a:solidFill>
+                <a:latin typeface="Consolas" panose="020B0609020204030204" pitchFamily="49" charset="0"/>
+              </a:rPr>
+              <a:t>case</a:t>
+            </a:r>
+            <a:r>
+              <a:rPr lang="de-CH" dirty="0">
+                <a:solidFill>
+                  <a:srgbClr val="D4D4D4"/>
+                </a:solidFill>
+                <a:latin typeface="Consolas" panose="020B0609020204030204" pitchFamily="49" charset="0"/>
+              </a:rPr>
+              <a:t> </a:t>
+            </a:r>
+            <a:r>
+              <a:rPr lang="de-CH" dirty="0">
+                <a:solidFill>
+                  <a:srgbClr val="CE9178"/>
+                </a:solidFill>
+                <a:latin typeface="Consolas" panose="020B0609020204030204" pitchFamily="49" charset="0"/>
+              </a:rPr>
+              <a:t>"LOGIN"</a:t>
+            </a:r>
+            <a:r>
+              <a:rPr lang="de-CH" dirty="0">
+                <a:solidFill>
+                  <a:srgbClr val="D4D4D4"/>
+                </a:solidFill>
+                <a:latin typeface="Consolas" panose="020B0609020204030204" pitchFamily="49" charset="0"/>
+              </a:rPr>
+              <a:t>:</a:t>
+            </a:r>
+          </a:p>
+          <a:p>
+            <a:r>
+              <a:rPr lang="de-CH" dirty="0">
+                <a:solidFill>
+                  <a:srgbClr val="4EC9B0"/>
+                </a:solidFill>
+                <a:latin typeface="Consolas" panose="020B0609020204030204" pitchFamily="49" charset="0"/>
+              </a:rPr>
+              <a:t>      console</a:t>
+            </a:r>
+            <a:r>
+              <a:rPr lang="de-CH" dirty="0">
+                <a:solidFill>
+                  <a:srgbClr val="D4D4D4"/>
+                </a:solidFill>
+                <a:latin typeface="Consolas" panose="020B0609020204030204" pitchFamily="49" charset="0"/>
+              </a:rPr>
+              <a:t>.</a:t>
+            </a:r>
+            <a:r>
+              <a:rPr lang="de-CH" dirty="0">
+                <a:solidFill>
+                  <a:srgbClr val="DCDCAA"/>
+                </a:solidFill>
+                <a:latin typeface="Consolas" panose="020B0609020204030204" pitchFamily="49" charset="0"/>
+              </a:rPr>
+              <a:t>log</a:t>
+            </a:r>
+            <a:r>
+              <a:rPr lang="de-CH" dirty="0">
+                <a:solidFill>
+                  <a:srgbClr val="D4D4D4"/>
+                </a:solidFill>
+                <a:latin typeface="Consolas" panose="020B0609020204030204" pitchFamily="49" charset="0"/>
+              </a:rPr>
+              <a:t>(</a:t>
+            </a:r>
+            <a:r>
+              <a:rPr lang="de-CH" dirty="0">
+                <a:solidFill>
+                  <a:srgbClr val="9CDCFE"/>
+                </a:solidFill>
+                <a:latin typeface="Consolas" panose="020B0609020204030204" pitchFamily="49" charset="0"/>
+              </a:rPr>
+              <a:t>action</a:t>
+            </a:r>
+            <a:r>
+              <a:rPr lang="de-CH" dirty="0">
+                <a:solidFill>
+                  <a:srgbClr val="D4D4D4"/>
+                </a:solidFill>
+                <a:latin typeface="Consolas" panose="020B0609020204030204" pitchFamily="49" charset="0"/>
+              </a:rPr>
+              <a:t>.</a:t>
+            </a:r>
+            <a:r>
+              <a:rPr lang="de-CH" dirty="0">
+                <a:solidFill>
+                  <a:srgbClr val="9CDCFE"/>
+                </a:solidFill>
+                <a:latin typeface="Consolas" panose="020B0609020204030204" pitchFamily="49" charset="0"/>
+              </a:rPr>
+              <a:t>name</a:t>
+            </a:r>
+            <a:r>
+              <a:rPr lang="de-CH" dirty="0">
+                <a:solidFill>
+                  <a:srgbClr val="D4D4D4"/>
+                </a:solidFill>
+                <a:latin typeface="Consolas" panose="020B0609020204030204" pitchFamily="49" charset="0"/>
+              </a:rPr>
+              <a:t> + </a:t>
+            </a:r>
+            <a:r>
+              <a:rPr lang="de-CH" dirty="0">
+                <a:solidFill>
+                  <a:srgbClr val="CE9178"/>
+                </a:solidFill>
+                <a:latin typeface="Consolas" panose="020B0609020204030204" pitchFamily="49" charset="0"/>
+              </a:rPr>
+              <a:t>" </a:t>
+            </a:r>
+            <a:r>
+              <a:rPr lang="de-CH" dirty="0" err="1">
+                <a:solidFill>
+                  <a:srgbClr val="CE9178"/>
+                </a:solidFill>
+                <a:latin typeface="Consolas" panose="020B0609020204030204" pitchFamily="49" charset="0"/>
+              </a:rPr>
+              <a:t>logged</a:t>
+            </a:r>
+            <a:r>
+              <a:rPr lang="de-CH" dirty="0">
+                <a:solidFill>
+                  <a:srgbClr val="CE9178"/>
+                </a:solidFill>
+                <a:latin typeface="Consolas" panose="020B0609020204030204" pitchFamily="49" charset="0"/>
+              </a:rPr>
+              <a:t> in"</a:t>
+            </a:r>
+            <a:r>
+              <a:rPr lang="de-CH" dirty="0">
+                <a:solidFill>
+                  <a:srgbClr val="D4D4D4"/>
+                </a:solidFill>
+                <a:latin typeface="Consolas" panose="020B0609020204030204" pitchFamily="49" charset="0"/>
+              </a:rPr>
+              <a:t>);</a:t>
+            </a:r>
+          </a:p>
+          <a:p>
+            <a:r>
+              <a:rPr lang="de-CH" dirty="0">
+                <a:solidFill>
+                  <a:srgbClr val="C586C0"/>
+                </a:solidFill>
+                <a:latin typeface="Consolas" panose="020B0609020204030204" pitchFamily="49" charset="0"/>
+              </a:rPr>
+              <a:t>      </a:t>
+            </a:r>
+            <a:r>
+              <a:rPr lang="de-CH" dirty="0" err="1">
+                <a:solidFill>
+                  <a:srgbClr val="C586C0"/>
+                </a:solidFill>
+                <a:latin typeface="Consolas" panose="020B0609020204030204" pitchFamily="49" charset="0"/>
+              </a:rPr>
+              <a:t>return</a:t>
+            </a:r>
+            <a:r>
+              <a:rPr lang="de-CH" dirty="0">
+                <a:solidFill>
+                  <a:srgbClr val="D4D4D4"/>
+                </a:solidFill>
+                <a:latin typeface="Consolas" panose="020B0609020204030204" pitchFamily="49" charset="0"/>
+              </a:rPr>
+              <a:t> </a:t>
+            </a:r>
+            <a:r>
+              <a:rPr lang="de-CH" dirty="0">
+                <a:solidFill>
+                  <a:srgbClr val="CE9178"/>
+                </a:solidFill>
+                <a:latin typeface="Consolas" panose="020B0609020204030204" pitchFamily="49" charset="0"/>
+              </a:rPr>
+              <a:t>"</a:t>
+            </a:r>
+            <a:r>
+              <a:rPr lang="de-CH" dirty="0" err="1">
+                <a:solidFill>
+                  <a:srgbClr val="CE9178"/>
+                </a:solidFill>
+                <a:latin typeface="Consolas" panose="020B0609020204030204" pitchFamily="49" charset="0"/>
+              </a:rPr>
+              <a:t>Logged</a:t>
+            </a:r>
+            <a:r>
+              <a:rPr lang="de-CH" dirty="0">
+                <a:solidFill>
+                  <a:srgbClr val="CE9178"/>
+                </a:solidFill>
+                <a:latin typeface="Consolas" panose="020B0609020204030204" pitchFamily="49" charset="0"/>
+              </a:rPr>
+              <a:t> In" </a:t>
+            </a:r>
+            <a:endParaRPr lang="de-CH" dirty="0">
+              <a:solidFill>
+                <a:srgbClr val="D4D4D4"/>
+              </a:solidFill>
+              <a:latin typeface="Consolas" panose="020B0609020204030204" pitchFamily="49" charset="0"/>
+            </a:endParaRPr>
+          </a:p>
+          <a:p>
+            <a:r>
+              <a:rPr lang="de-CH" dirty="0">
+                <a:solidFill>
+                  <a:srgbClr val="C586C0"/>
+                </a:solidFill>
+                <a:latin typeface="Consolas" panose="020B0609020204030204" pitchFamily="49" charset="0"/>
+              </a:rPr>
+              <a:t>    </a:t>
+            </a:r>
+            <a:r>
+              <a:rPr lang="de-CH" dirty="0" err="1">
+                <a:solidFill>
+                  <a:srgbClr val="C586C0"/>
+                </a:solidFill>
+                <a:latin typeface="Consolas" panose="020B0609020204030204" pitchFamily="49" charset="0"/>
+              </a:rPr>
+              <a:t>default</a:t>
+            </a:r>
+            <a:r>
+              <a:rPr lang="de-CH" dirty="0">
+                <a:solidFill>
+                  <a:srgbClr val="D4D4D4"/>
+                </a:solidFill>
+                <a:latin typeface="Consolas" panose="020B0609020204030204" pitchFamily="49" charset="0"/>
+              </a:rPr>
+              <a:t>:</a:t>
+            </a:r>
+          </a:p>
+          <a:p>
+            <a:r>
+              <a:rPr lang="de-CH" dirty="0">
+                <a:solidFill>
+                  <a:srgbClr val="4EC9B0"/>
+                </a:solidFill>
+                <a:latin typeface="Consolas" panose="020B0609020204030204" pitchFamily="49" charset="0"/>
+              </a:rPr>
+              <a:t>      console</a:t>
+            </a:r>
+            <a:r>
+              <a:rPr lang="de-CH" dirty="0">
+                <a:solidFill>
+                  <a:srgbClr val="D4D4D4"/>
+                </a:solidFill>
+                <a:latin typeface="Consolas" panose="020B0609020204030204" pitchFamily="49" charset="0"/>
+              </a:rPr>
+              <a:t>.</a:t>
+            </a:r>
+            <a:r>
+              <a:rPr lang="de-CH" dirty="0">
+                <a:solidFill>
+                  <a:srgbClr val="DCDCAA"/>
+                </a:solidFill>
+                <a:latin typeface="Consolas" panose="020B0609020204030204" pitchFamily="49" charset="0"/>
+              </a:rPr>
+              <a:t>log</a:t>
+            </a:r>
+            <a:r>
+              <a:rPr lang="de-CH" dirty="0">
+                <a:solidFill>
+                  <a:srgbClr val="D4D4D4"/>
+                </a:solidFill>
+                <a:latin typeface="Consolas" panose="020B0609020204030204" pitchFamily="49" charset="0"/>
+              </a:rPr>
+              <a:t>(</a:t>
+            </a:r>
+            <a:r>
+              <a:rPr lang="de-CH" dirty="0">
+                <a:solidFill>
+                  <a:srgbClr val="CE9178"/>
+                </a:solidFill>
+                <a:latin typeface="Consolas" panose="020B0609020204030204" pitchFamily="49" charset="0"/>
+              </a:rPr>
+              <a:t>"WTF"</a:t>
+            </a:r>
+            <a:r>
+              <a:rPr lang="de-CH" dirty="0">
+                <a:solidFill>
+                  <a:srgbClr val="D4D4D4"/>
+                </a:solidFill>
+                <a:latin typeface="Consolas" panose="020B0609020204030204" pitchFamily="49" charset="0"/>
+              </a:rPr>
+              <a:t>);</a:t>
+            </a:r>
+          </a:p>
+          <a:p>
+            <a:r>
+              <a:rPr lang="de-CH" dirty="0">
+                <a:solidFill>
+                  <a:srgbClr val="D4D4D4"/>
+                </a:solidFill>
+                <a:latin typeface="Consolas" panose="020B0609020204030204" pitchFamily="49" charset="0"/>
+              </a:rPr>
+              <a:t>  }</a:t>
+            </a:r>
+          </a:p>
+          <a:p>
+            <a:r>
+              <a:rPr lang="de-CH" dirty="0">
+                <a:solidFill>
+                  <a:srgbClr val="D4D4D4"/>
+                </a:solidFill>
+                <a:latin typeface="Consolas" panose="020B0609020204030204" pitchFamily="49" charset="0"/>
+              </a:rPr>
+              <a:t>}</a:t>
+            </a:r>
+          </a:p>
+        </p:txBody>
+      </p:sp>
+      <p:sp>
+        <p:nvSpPr>
+          <p:cNvPr id="5" name="Speech Bubble: Oval 4">
+            <a:extLst>
+              <a:ext uri="{FF2B5EF4-FFF2-40B4-BE49-F238E27FC236}">
+                <a16:creationId xmlns:a16="http://schemas.microsoft.com/office/drawing/2014/main" id="{1BEC9447-F78D-47DD-BB06-EE1484E63825}"/>
+              </a:ext>
+            </a:extLst>
+          </p:cNvPr>
+          <p:cNvSpPr/>
+          <p:nvPr/>
+        </p:nvSpPr>
+        <p:spPr>
+          <a:xfrm>
+            <a:off x="7628860" y="2589028"/>
+            <a:ext cx="3971261" cy="2227521"/>
+          </a:xfrm>
+          <a:prstGeom prst="wedgeEllipseCallout">
+            <a:avLst>
+              <a:gd name="adj1" fmla="val -67160"/>
+              <a:gd name="adj2" fmla="val 32965"/>
+            </a:avLst>
+          </a:prstGeom>
+          <a:solidFill>
+            <a:schemeClr val="bg1">
+              <a:lumMod val="95000"/>
+            </a:schemeClr>
+          </a:solidFill>
+          <a:ln w="76200">
+            <a:solidFill>
+              <a:srgbClr val="C00000"/>
+            </a:solidFill>
+          </a:ln>
+        </p:spPr>
+        <p:style>
+          <a:lnRef idx="2">
+            <a:schemeClr val="accent1">
+              <a:shade val="50000"/>
+            </a:schemeClr>
+          </a:lnRef>
+          <a:fillRef idx="1">
+            <a:schemeClr val="accent1"/>
+          </a:fillRef>
+          <a:effectRef idx="0">
+            <a:schemeClr val="accent1"/>
+          </a:effectRef>
+          <a:fontRef idx="minor">
+            <a:schemeClr val="lt1"/>
+          </a:fontRef>
+        </p:style>
+        <p:txBody>
+          <a:bodyPr rot="0" spcFirstLastPara="0" vertOverflow="overflow" horzOverflow="overflow" vert="horz" wrap="square" lIns="91440" tIns="45720" rIns="91440" bIns="45720" numCol="1" spcCol="0" rtlCol="0" fromWordArt="0" anchor="ctr" anchorCtr="0" forceAA="0" compatLnSpc="1">
+            <a:prstTxWarp prst="textNoShape">
+              <a:avLst/>
+            </a:prstTxWarp>
+            <a:noAutofit/>
+          </a:bodyPr>
+          <a:lstStyle/>
+          <a:p>
+            <a:pPr algn="ctr"/>
+            <a:r>
+              <a:rPr lang="en-GB" sz="3200" dirty="0">
+                <a:ln w="0"/>
+                <a:solidFill>
+                  <a:schemeClr val="tx1"/>
+                </a:solidFill>
+                <a:effectLst>
+                  <a:outerShdw blurRad="38100" dist="19050" dir="2700000" algn="tl" rotWithShape="0">
+                    <a:schemeClr val="dk1">
+                      <a:alpha val="40000"/>
+                    </a:schemeClr>
+                  </a:outerShdw>
+                </a:effectLst>
+              </a:rPr>
+              <a:t>We don’t handle all cases anymore!</a:t>
+            </a:r>
+          </a:p>
+        </p:txBody>
+      </p:sp>
+    </p:spTree>
+    <p:extLst>
+      <p:ext uri="{BB962C8B-B14F-4D97-AF65-F5344CB8AC3E}">
+        <p14:creationId xmlns:p14="http://schemas.microsoft.com/office/powerpoint/2010/main" val="927749452"/>
+      </p:ext>
+    </p:extLst>
+  </p:cSld>
+  <p:clrMapOvr>
+    <a:masterClrMapping/>
+  </p:clrMapOvr>
+  <p:timing>
+    <p:tnLst>
+      <p:par>
+        <p:cTn id="1" dur="indefinite" restart="never" nodeType="tmRoot">
+          <p:childTnLst>
+            <p:seq concurrent="1" nextAc="seek">
+              <p:cTn id="2" dur="indefinite" nodeType="mainSeq">
+                <p:childTnLst>
+                  <p:par>
+                    <p:cTn id="3" fill="hold">
+                      <p:stCondLst>
+                        <p:cond delay="indefinite"/>
+                      </p:stCondLst>
+                      <p:childTnLst>
+                        <p:par>
+                          <p:cTn id="4" fill="hold">
+                            <p:stCondLst>
+                              <p:cond delay="0"/>
+                            </p:stCondLst>
+                            <p:childTnLst>
+                              <p:par>
+                                <p:cTn id="5" presetID="1" presetClass="entr" presetSubtype="0" fill="hold" grpId="0" nodeType="clickEffect">
+                                  <p:stCondLst>
+                                    <p:cond delay="0"/>
+                                  </p:stCondLst>
+                                  <p:childTnLst>
+                                    <p:set>
+                                      <p:cBhvr>
+                                        <p:cTn id="6" dur="1" fill="hold">
+                                          <p:stCondLst>
+                                            <p:cond delay="0"/>
+                                          </p:stCondLst>
+                                        </p:cTn>
+                                        <p:tgtEl>
+                                          <p:spTgt spid="5"/>
+                                        </p:tgtEl>
+                                        <p:attrNameLst>
+                                          <p:attrName>style.visibility</p:attrName>
+                                        </p:attrNameLst>
+                                      </p:cBhvr>
+                                      <p:to>
+                                        <p:strVal val="visible"/>
+                                      </p:to>
+                                    </p:set>
+                                  </p:childTnLst>
+                                </p:cTn>
+                              </p:par>
+                            </p:childTnLst>
+                          </p:cTn>
+                        </p:par>
+                      </p:childTnLst>
+                    </p:cTn>
+                  </p:par>
+                </p:childTnLst>
+              </p:cTn>
+              <p:prevCondLst>
+                <p:cond evt="onPrev" delay="0">
+                  <p:tgtEl>
+                    <p:sldTgt/>
+                  </p:tgtEl>
+                </p:cond>
+              </p:prevCondLst>
+              <p:nextCondLst>
+                <p:cond evt="onNext" delay="0">
+                  <p:tgtEl>
+                    <p:sldTgt/>
+                  </p:tgtEl>
+                </p:cond>
+              </p:nextCondLst>
+            </p:seq>
+          </p:childTnLst>
+        </p:cTn>
+      </p:par>
+    </p:tnLst>
+    <p:bldLst>
+      <p:bldP spid="5" grpId="0" animBg="1"/>
+    </p:bldLst>
+  </p:timing>
+</p:sld>
+</file>
+
+<file path=ppt/slides/slide22.xml><?xml version="1.0" encoding="utf-8"?>
+<p:sld xmlns:a="http://schemas.openxmlformats.org/drawingml/2006/main" xmlns:r="http://schemas.openxmlformats.org/officeDocument/2006/relationships" xmlns:p="http://schemas.openxmlformats.org/presentationml/2006/main">
+  <p:cSld>
+    <p:spTree>
+      <p:nvGrpSpPr>
+        <p:cNvPr id="1" name=""/>
+        <p:cNvGrpSpPr/>
+        <p:nvPr/>
+      </p:nvGrpSpPr>
+      <p:grpSpPr>
+        <a:xfrm>
+          <a:off x="0" y="0"/>
+          <a:ext cx="0" cy="0"/>
+          <a:chOff x="0" y="0"/>
+          <a:chExt cx="0" cy="0"/>
+        </a:xfrm>
+      </p:grpSpPr>
+      <p:sp>
+        <p:nvSpPr>
+          <p:cNvPr id="2" name="Title 1">
+            <a:extLst>
+              <a:ext uri="{FF2B5EF4-FFF2-40B4-BE49-F238E27FC236}">
+                <a16:creationId xmlns:a16="http://schemas.microsoft.com/office/drawing/2014/main" id="{881C8C4A-DA34-4933-BE30-83EDE40DD3F3}"/>
+              </a:ext>
+            </a:extLst>
+          </p:cNvPr>
+          <p:cNvSpPr>
+            <a:spLocks noGrp="1"/>
+          </p:cNvSpPr>
+          <p:nvPr>
+            <p:ph type="title"/>
+          </p:nvPr>
+        </p:nvSpPr>
+        <p:spPr/>
+        <p:txBody>
+          <a:bodyPr/>
+          <a:lstStyle/>
+          <a:p>
+            <a:r>
+              <a:rPr lang="en-GB" dirty="0"/>
+              <a:t>Example of using Union Types</a:t>
+            </a:r>
+          </a:p>
+        </p:txBody>
+      </p:sp>
+      <p:sp>
+        <p:nvSpPr>
+          <p:cNvPr id="3" name="Content Placeholder 2">
+            <a:extLst>
+              <a:ext uri="{FF2B5EF4-FFF2-40B4-BE49-F238E27FC236}">
+                <a16:creationId xmlns:a16="http://schemas.microsoft.com/office/drawing/2014/main" id="{DD7A9F0C-3198-4D5F-B54B-3C995CC9FC18}"/>
+              </a:ext>
+            </a:extLst>
+          </p:cNvPr>
+          <p:cNvSpPr>
+            <a:spLocks noGrp="1"/>
+          </p:cNvSpPr>
+          <p:nvPr>
+            <p:ph idx="1"/>
+          </p:nvPr>
+        </p:nvSpPr>
+        <p:spPr/>
+        <p:txBody>
+          <a:bodyPr/>
+          <a:lstStyle/>
+          <a:p>
+            <a:pPr marL="0" indent="0">
+              <a:buNone/>
+            </a:pPr>
+            <a:endParaRPr lang="en-GB" dirty="0"/>
+          </a:p>
+        </p:txBody>
+      </p:sp>
+      <p:sp>
+        <p:nvSpPr>
+          <p:cNvPr id="4" name="Rectangle 3">
+            <a:extLst>
+              <a:ext uri="{FF2B5EF4-FFF2-40B4-BE49-F238E27FC236}">
+                <a16:creationId xmlns:a16="http://schemas.microsoft.com/office/drawing/2014/main" id="{0217E739-B41C-417F-B235-6F10CF968E55}"/>
+              </a:ext>
+            </a:extLst>
+          </p:cNvPr>
+          <p:cNvSpPr/>
+          <p:nvPr/>
+        </p:nvSpPr>
+        <p:spPr>
+          <a:xfrm>
+            <a:off x="268308" y="1184858"/>
+            <a:ext cx="11655379" cy="4801314"/>
+          </a:xfrm>
+          <a:prstGeom prst="rect">
+            <a:avLst/>
+          </a:prstGeom>
+          <a:solidFill>
+            <a:schemeClr val="tx1">
+              <a:lumMod val="75000"/>
+              <a:lumOff val="25000"/>
+            </a:schemeClr>
+          </a:solidFill>
+          <a:ln>
+            <a:noFill/>
+          </a:ln>
+        </p:spPr>
+        <p:txBody>
+          <a:bodyPr wrap="square">
+            <a:spAutoFit/>
+          </a:bodyPr>
+          <a:lstStyle/>
+          <a:p>
+            <a:r>
+              <a:rPr lang="de-CH" dirty="0">
+                <a:solidFill>
+                  <a:srgbClr val="569CD6"/>
+                </a:solidFill>
+                <a:latin typeface="Consolas" panose="020B0609020204030204" pitchFamily="49" charset="0"/>
+              </a:rPr>
+              <a:t>type</a:t>
+            </a:r>
+            <a:r>
+              <a:rPr lang="de-CH" dirty="0">
+                <a:solidFill>
+                  <a:srgbClr val="D4D4D4"/>
+                </a:solidFill>
+                <a:latin typeface="Consolas" panose="020B0609020204030204" pitchFamily="49" charset="0"/>
+              </a:rPr>
+              <a:t> </a:t>
+            </a:r>
+            <a:r>
+              <a:rPr lang="de-CH" dirty="0">
+                <a:solidFill>
+                  <a:srgbClr val="4EC9B0"/>
+                </a:solidFill>
+                <a:latin typeface="Consolas" panose="020B0609020204030204" pitchFamily="49" charset="0"/>
+              </a:rPr>
+              <a:t>Actions</a:t>
+            </a:r>
+            <a:r>
+              <a:rPr lang="de-CH" dirty="0">
+                <a:solidFill>
+                  <a:srgbClr val="D4D4D4"/>
+                </a:solidFill>
+                <a:latin typeface="Consolas" panose="020B0609020204030204" pitchFamily="49" charset="0"/>
+              </a:rPr>
+              <a:t> = </a:t>
+            </a:r>
+            <a:r>
+              <a:rPr lang="de-CH" dirty="0" err="1">
+                <a:solidFill>
+                  <a:srgbClr val="4EC9B0"/>
+                </a:solidFill>
+                <a:latin typeface="Consolas" panose="020B0609020204030204" pitchFamily="49" charset="0"/>
+              </a:rPr>
+              <a:t>InitAction</a:t>
+            </a:r>
+            <a:r>
+              <a:rPr lang="de-CH" dirty="0">
+                <a:solidFill>
+                  <a:srgbClr val="D4D4D4"/>
+                </a:solidFill>
+                <a:latin typeface="Consolas" panose="020B0609020204030204" pitchFamily="49" charset="0"/>
+              </a:rPr>
+              <a:t> | </a:t>
+            </a:r>
+            <a:r>
+              <a:rPr lang="de-CH" dirty="0" err="1">
+                <a:solidFill>
+                  <a:srgbClr val="4EC9B0"/>
+                </a:solidFill>
+                <a:latin typeface="Consolas" panose="020B0609020204030204" pitchFamily="49" charset="0"/>
+              </a:rPr>
+              <a:t>LoginAction</a:t>
+            </a:r>
+            <a:r>
+              <a:rPr lang="de-CH" dirty="0">
+                <a:solidFill>
+                  <a:srgbClr val="D4D4D4"/>
+                </a:solidFill>
+                <a:latin typeface="Consolas" panose="020B0609020204030204" pitchFamily="49" charset="0"/>
+              </a:rPr>
+              <a:t> | </a:t>
+            </a:r>
+            <a:r>
+              <a:rPr lang="de-CH" dirty="0" err="1">
+                <a:solidFill>
+                  <a:srgbClr val="4EC9B0"/>
+                </a:solidFill>
+                <a:latin typeface="Consolas" panose="020B0609020204030204" pitchFamily="49" charset="0"/>
+              </a:rPr>
+              <a:t>LogOutAction</a:t>
+            </a:r>
+            <a:r>
+              <a:rPr lang="de-CH" dirty="0">
+                <a:solidFill>
+                  <a:srgbClr val="D4D4D4"/>
+                </a:solidFill>
+                <a:latin typeface="Consolas" panose="020B0609020204030204" pitchFamily="49" charset="0"/>
+              </a:rPr>
+              <a:t>;</a:t>
+            </a:r>
+          </a:p>
+          <a:p>
+            <a:br>
+              <a:rPr lang="de-CH" dirty="0">
+                <a:solidFill>
+                  <a:srgbClr val="D4D4D4"/>
+                </a:solidFill>
+                <a:latin typeface="Consolas" panose="020B0609020204030204" pitchFamily="49" charset="0"/>
+              </a:rPr>
+            </a:br>
+            <a:r>
+              <a:rPr lang="de-CH" dirty="0" err="1">
+                <a:solidFill>
+                  <a:srgbClr val="569CD6"/>
+                </a:solidFill>
+                <a:latin typeface="Consolas" panose="020B0609020204030204" pitchFamily="49" charset="0"/>
+              </a:rPr>
+              <a:t>function</a:t>
+            </a:r>
+            <a:r>
+              <a:rPr lang="de-CH" dirty="0">
+                <a:solidFill>
+                  <a:srgbClr val="D4D4D4"/>
+                </a:solidFill>
+                <a:latin typeface="Consolas" panose="020B0609020204030204" pitchFamily="49" charset="0"/>
+              </a:rPr>
+              <a:t> </a:t>
+            </a:r>
+            <a:r>
+              <a:rPr lang="de-CH" dirty="0" err="1">
+                <a:solidFill>
+                  <a:srgbClr val="DCDCAA"/>
+                </a:solidFill>
+                <a:latin typeface="Consolas" panose="020B0609020204030204" pitchFamily="49" charset="0"/>
+              </a:rPr>
+              <a:t>assertNever</a:t>
+            </a:r>
+            <a:r>
+              <a:rPr lang="de-CH" dirty="0">
+                <a:solidFill>
+                  <a:srgbClr val="D4D4D4"/>
+                </a:solidFill>
+                <a:latin typeface="Consolas" panose="020B0609020204030204" pitchFamily="49" charset="0"/>
+              </a:rPr>
+              <a:t>(</a:t>
+            </a:r>
+            <a:r>
+              <a:rPr lang="de-CH" dirty="0">
+                <a:solidFill>
+                  <a:srgbClr val="9CDCFE"/>
+                </a:solidFill>
+                <a:latin typeface="Consolas" panose="020B0609020204030204" pitchFamily="49" charset="0"/>
+              </a:rPr>
+              <a:t>x</a:t>
+            </a:r>
+            <a:r>
+              <a:rPr lang="de-CH" dirty="0">
+                <a:solidFill>
+                  <a:srgbClr val="D4D4D4"/>
+                </a:solidFill>
+                <a:latin typeface="Consolas" panose="020B0609020204030204" pitchFamily="49" charset="0"/>
+              </a:rPr>
+              <a:t>: </a:t>
+            </a:r>
+            <a:r>
+              <a:rPr lang="de-CH" dirty="0" err="1">
+                <a:solidFill>
+                  <a:srgbClr val="4EC9B0"/>
+                </a:solidFill>
+                <a:latin typeface="Consolas" panose="020B0609020204030204" pitchFamily="49" charset="0"/>
+              </a:rPr>
+              <a:t>never</a:t>
+            </a:r>
+            <a:r>
+              <a:rPr lang="de-CH" dirty="0">
+                <a:solidFill>
+                  <a:srgbClr val="D4D4D4"/>
+                </a:solidFill>
+                <a:latin typeface="Consolas" panose="020B0609020204030204" pitchFamily="49" charset="0"/>
+              </a:rPr>
+              <a:t>): </a:t>
+            </a:r>
+            <a:r>
+              <a:rPr lang="de-CH" dirty="0" err="1">
+                <a:solidFill>
+                  <a:srgbClr val="4EC9B0"/>
+                </a:solidFill>
+                <a:latin typeface="Consolas" panose="020B0609020204030204" pitchFamily="49" charset="0"/>
+              </a:rPr>
+              <a:t>never</a:t>
+            </a:r>
+            <a:r>
+              <a:rPr lang="de-CH" dirty="0">
+                <a:solidFill>
+                  <a:srgbClr val="D4D4D4"/>
+                </a:solidFill>
+                <a:latin typeface="Consolas" panose="020B0609020204030204" pitchFamily="49" charset="0"/>
+              </a:rPr>
+              <a:t> {</a:t>
+            </a:r>
+          </a:p>
+          <a:p>
+            <a:r>
+              <a:rPr lang="de-CH" dirty="0">
+                <a:solidFill>
+                  <a:srgbClr val="C586C0"/>
+                </a:solidFill>
+                <a:latin typeface="Consolas" panose="020B0609020204030204" pitchFamily="49" charset="0"/>
+              </a:rPr>
+              <a:t>  </a:t>
+            </a:r>
+            <a:r>
+              <a:rPr lang="de-CH" dirty="0" err="1">
+                <a:solidFill>
+                  <a:srgbClr val="C586C0"/>
+                </a:solidFill>
+                <a:latin typeface="Consolas" panose="020B0609020204030204" pitchFamily="49" charset="0"/>
+              </a:rPr>
+              <a:t>throw</a:t>
+            </a:r>
+            <a:r>
+              <a:rPr lang="de-CH" dirty="0">
+                <a:solidFill>
+                  <a:srgbClr val="D4D4D4"/>
+                </a:solidFill>
+                <a:latin typeface="Consolas" panose="020B0609020204030204" pitchFamily="49" charset="0"/>
+              </a:rPr>
+              <a:t> </a:t>
+            </a:r>
+            <a:r>
+              <a:rPr lang="de-CH" dirty="0" err="1">
+                <a:solidFill>
+                  <a:srgbClr val="569CD6"/>
+                </a:solidFill>
+                <a:latin typeface="Consolas" panose="020B0609020204030204" pitchFamily="49" charset="0"/>
+              </a:rPr>
+              <a:t>new</a:t>
+            </a:r>
+            <a:r>
+              <a:rPr lang="de-CH" dirty="0">
+                <a:solidFill>
+                  <a:srgbClr val="D4D4D4"/>
+                </a:solidFill>
+                <a:latin typeface="Consolas" panose="020B0609020204030204" pitchFamily="49" charset="0"/>
+              </a:rPr>
+              <a:t> </a:t>
+            </a:r>
+            <a:r>
+              <a:rPr lang="de-CH" dirty="0">
+                <a:solidFill>
+                  <a:srgbClr val="4EC9B0"/>
+                </a:solidFill>
+                <a:latin typeface="Consolas" panose="020B0609020204030204" pitchFamily="49" charset="0"/>
+              </a:rPr>
+              <a:t>Error</a:t>
+            </a:r>
+            <a:r>
+              <a:rPr lang="de-CH" dirty="0">
+                <a:solidFill>
+                  <a:srgbClr val="D4D4D4"/>
+                </a:solidFill>
+                <a:latin typeface="Consolas" panose="020B0609020204030204" pitchFamily="49" charset="0"/>
+              </a:rPr>
+              <a:t>(</a:t>
+            </a:r>
+            <a:r>
+              <a:rPr lang="de-CH" dirty="0">
+                <a:solidFill>
+                  <a:srgbClr val="CE9178"/>
+                </a:solidFill>
+                <a:latin typeface="Consolas" panose="020B0609020204030204" pitchFamily="49" charset="0"/>
+              </a:rPr>
+              <a:t>"</a:t>
+            </a:r>
+            <a:r>
+              <a:rPr lang="de-CH" dirty="0" err="1">
+                <a:solidFill>
+                  <a:srgbClr val="CE9178"/>
+                </a:solidFill>
+                <a:latin typeface="Consolas" panose="020B0609020204030204" pitchFamily="49" charset="0"/>
+              </a:rPr>
+              <a:t>Unexpected</a:t>
+            </a:r>
+            <a:r>
+              <a:rPr lang="de-CH" dirty="0">
+                <a:solidFill>
+                  <a:srgbClr val="CE9178"/>
+                </a:solidFill>
+                <a:latin typeface="Consolas" panose="020B0609020204030204" pitchFamily="49" charset="0"/>
+              </a:rPr>
+              <a:t> </a:t>
+            </a:r>
+            <a:r>
+              <a:rPr lang="de-CH" dirty="0" err="1">
+                <a:solidFill>
+                  <a:srgbClr val="CE9178"/>
+                </a:solidFill>
+                <a:latin typeface="Consolas" panose="020B0609020204030204" pitchFamily="49" charset="0"/>
+              </a:rPr>
+              <a:t>object</a:t>
+            </a:r>
+            <a:r>
+              <a:rPr lang="de-CH" dirty="0">
+                <a:solidFill>
+                  <a:srgbClr val="CE9178"/>
+                </a:solidFill>
+                <a:latin typeface="Consolas" panose="020B0609020204030204" pitchFamily="49" charset="0"/>
+              </a:rPr>
+              <a:t>: "</a:t>
+            </a:r>
+            <a:r>
+              <a:rPr lang="de-CH" dirty="0">
+                <a:solidFill>
+                  <a:srgbClr val="D4D4D4"/>
+                </a:solidFill>
+                <a:latin typeface="Consolas" panose="020B0609020204030204" pitchFamily="49" charset="0"/>
+              </a:rPr>
+              <a:t> + </a:t>
+            </a:r>
+            <a:r>
+              <a:rPr lang="de-CH" dirty="0">
+                <a:solidFill>
+                  <a:srgbClr val="9CDCFE"/>
+                </a:solidFill>
+                <a:latin typeface="Consolas" panose="020B0609020204030204" pitchFamily="49" charset="0"/>
+              </a:rPr>
+              <a:t>x</a:t>
+            </a:r>
+            <a:r>
+              <a:rPr lang="de-CH" dirty="0">
+                <a:solidFill>
+                  <a:srgbClr val="D4D4D4"/>
+                </a:solidFill>
+                <a:latin typeface="Consolas" panose="020B0609020204030204" pitchFamily="49" charset="0"/>
+              </a:rPr>
+              <a:t>);</a:t>
+            </a:r>
+          </a:p>
+          <a:p>
+            <a:r>
+              <a:rPr lang="de-CH" dirty="0">
+                <a:solidFill>
+                  <a:srgbClr val="D4D4D4"/>
+                </a:solidFill>
+                <a:latin typeface="Consolas" panose="020B0609020204030204" pitchFamily="49" charset="0"/>
+              </a:rPr>
+              <a:t>}</a:t>
+            </a:r>
+          </a:p>
+          <a:p>
+            <a:br>
+              <a:rPr lang="de-CH" dirty="0">
+                <a:solidFill>
+                  <a:srgbClr val="D4D4D4"/>
+                </a:solidFill>
+                <a:latin typeface="Consolas" panose="020B0609020204030204" pitchFamily="49" charset="0"/>
+              </a:rPr>
+            </a:br>
+            <a:r>
+              <a:rPr lang="de-CH" dirty="0" err="1">
+                <a:solidFill>
+                  <a:srgbClr val="569CD6"/>
+                </a:solidFill>
+                <a:latin typeface="Consolas" panose="020B0609020204030204" pitchFamily="49" charset="0"/>
+              </a:rPr>
+              <a:t>function</a:t>
+            </a:r>
+            <a:r>
+              <a:rPr lang="de-CH" dirty="0">
+                <a:solidFill>
+                  <a:srgbClr val="D4D4D4"/>
+                </a:solidFill>
+                <a:latin typeface="Consolas" panose="020B0609020204030204" pitchFamily="49" charset="0"/>
+              </a:rPr>
+              <a:t> </a:t>
+            </a:r>
+            <a:r>
+              <a:rPr lang="de-CH" dirty="0" err="1">
+                <a:solidFill>
+                  <a:srgbClr val="DCDCAA"/>
+                </a:solidFill>
+                <a:latin typeface="Consolas" panose="020B0609020204030204" pitchFamily="49" charset="0"/>
+              </a:rPr>
+              <a:t>exhaustiveHandleAction</a:t>
+            </a:r>
+            <a:r>
+              <a:rPr lang="de-CH" dirty="0">
+                <a:solidFill>
+                  <a:srgbClr val="D4D4D4"/>
+                </a:solidFill>
+                <a:latin typeface="Consolas" panose="020B0609020204030204" pitchFamily="49" charset="0"/>
+              </a:rPr>
+              <a:t>(</a:t>
+            </a:r>
+            <a:r>
+              <a:rPr lang="de-CH" dirty="0" err="1">
+                <a:solidFill>
+                  <a:srgbClr val="9CDCFE"/>
+                </a:solidFill>
+                <a:latin typeface="Consolas" panose="020B0609020204030204" pitchFamily="49" charset="0"/>
+              </a:rPr>
+              <a:t>action</a:t>
+            </a:r>
+            <a:r>
+              <a:rPr lang="de-CH" dirty="0">
+                <a:solidFill>
+                  <a:srgbClr val="D4D4D4"/>
+                </a:solidFill>
+                <a:latin typeface="Consolas" panose="020B0609020204030204" pitchFamily="49" charset="0"/>
+              </a:rPr>
+              <a:t>: </a:t>
+            </a:r>
+            <a:r>
+              <a:rPr lang="de-CH" dirty="0">
+                <a:solidFill>
+                  <a:srgbClr val="4EC9B0"/>
+                </a:solidFill>
+                <a:latin typeface="Consolas" panose="020B0609020204030204" pitchFamily="49" charset="0"/>
+              </a:rPr>
+              <a:t>Actions</a:t>
+            </a:r>
+            <a:r>
+              <a:rPr lang="de-CH" dirty="0">
+                <a:solidFill>
+                  <a:srgbClr val="D4D4D4"/>
+                </a:solidFill>
+                <a:latin typeface="Consolas" panose="020B0609020204030204" pitchFamily="49" charset="0"/>
+              </a:rPr>
+              <a:t>) {</a:t>
+            </a:r>
+          </a:p>
+          <a:p>
+            <a:r>
+              <a:rPr lang="de-CH" dirty="0">
+                <a:solidFill>
+                  <a:srgbClr val="C586C0"/>
+                </a:solidFill>
+                <a:latin typeface="Consolas" panose="020B0609020204030204" pitchFamily="49" charset="0"/>
+              </a:rPr>
+              <a:t>  switch</a:t>
+            </a:r>
+            <a:r>
+              <a:rPr lang="de-CH" dirty="0">
+                <a:solidFill>
+                  <a:srgbClr val="D4D4D4"/>
+                </a:solidFill>
+                <a:latin typeface="Consolas" panose="020B0609020204030204" pitchFamily="49" charset="0"/>
+              </a:rPr>
+              <a:t> (</a:t>
+            </a:r>
+            <a:r>
+              <a:rPr lang="de-CH" dirty="0" err="1">
+                <a:solidFill>
+                  <a:srgbClr val="9CDCFE"/>
+                </a:solidFill>
+                <a:latin typeface="Consolas" panose="020B0609020204030204" pitchFamily="49" charset="0"/>
+              </a:rPr>
+              <a:t>action</a:t>
+            </a:r>
+            <a:r>
+              <a:rPr lang="de-CH" dirty="0" err="1">
+                <a:solidFill>
+                  <a:srgbClr val="D4D4D4"/>
+                </a:solidFill>
+                <a:latin typeface="Consolas" panose="020B0609020204030204" pitchFamily="49" charset="0"/>
+              </a:rPr>
+              <a:t>.</a:t>
+            </a:r>
+            <a:r>
+              <a:rPr lang="de-CH" dirty="0" err="1">
+                <a:solidFill>
+                  <a:srgbClr val="9CDCFE"/>
+                </a:solidFill>
+                <a:latin typeface="Consolas" panose="020B0609020204030204" pitchFamily="49" charset="0"/>
+              </a:rPr>
+              <a:t>type</a:t>
+            </a:r>
+            <a:r>
+              <a:rPr lang="de-CH" dirty="0">
+                <a:solidFill>
+                  <a:srgbClr val="D4D4D4"/>
+                </a:solidFill>
+                <a:latin typeface="Consolas" panose="020B0609020204030204" pitchFamily="49" charset="0"/>
+              </a:rPr>
+              <a:t>) {</a:t>
+            </a:r>
+          </a:p>
+          <a:p>
+            <a:r>
+              <a:rPr lang="de-CH" dirty="0">
+                <a:solidFill>
+                  <a:srgbClr val="C586C0"/>
+                </a:solidFill>
+                <a:latin typeface="Consolas" panose="020B0609020204030204" pitchFamily="49" charset="0"/>
+              </a:rPr>
+              <a:t>    </a:t>
+            </a:r>
+            <a:r>
+              <a:rPr lang="de-CH" dirty="0" err="1">
+                <a:solidFill>
+                  <a:srgbClr val="C586C0"/>
+                </a:solidFill>
+                <a:latin typeface="Consolas" panose="020B0609020204030204" pitchFamily="49" charset="0"/>
+              </a:rPr>
+              <a:t>case</a:t>
+            </a:r>
+            <a:r>
+              <a:rPr lang="de-CH" dirty="0">
+                <a:solidFill>
+                  <a:srgbClr val="D4D4D4"/>
+                </a:solidFill>
+                <a:latin typeface="Consolas" panose="020B0609020204030204" pitchFamily="49" charset="0"/>
+              </a:rPr>
+              <a:t> </a:t>
+            </a:r>
+            <a:r>
+              <a:rPr lang="de-CH" dirty="0">
+                <a:solidFill>
+                  <a:srgbClr val="CE9178"/>
+                </a:solidFill>
+                <a:latin typeface="Consolas" panose="020B0609020204030204" pitchFamily="49" charset="0"/>
+              </a:rPr>
+              <a:t>"INIT"</a:t>
+            </a:r>
+            <a:r>
+              <a:rPr lang="de-CH" dirty="0">
+                <a:solidFill>
+                  <a:srgbClr val="D4D4D4"/>
+                </a:solidFill>
+                <a:latin typeface="Consolas" panose="020B0609020204030204" pitchFamily="49" charset="0"/>
+              </a:rPr>
+              <a:t>:</a:t>
+            </a:r>
+          </a:p>
+          <a:p>
+            <a:r>
+              <a:rPr lang="de-CH" dirty="0">
+                <a:solidFill>
+                  <a:srgbClr val="C586C0"/>
+                </a:solidFill>
+                <a:latin typeface="Consolas" panose="020B0609020204030204" pitchFamily="49" charset="0"/>
+              </a:rPr>
+              <a:t>      </a:t>
+            </a:r>
+            <a:r>
+              <a:rPr lang="de-CH" dirty="0" err="1">
+                <a:solidFill>
+                  <a:srgbClr val="C586C0"/>
+                </a:solidFill>
+                <a:latin typeface="Consolas" panose="020B0609020204030204" pitchFamily="49" charset="0"/>
+              </a:rPr>
+              <a:t>return</a:t>
+            </a:r>
+            <a:r>
+              <a:rPr lang="de-CH" dirty="0">
+                <a:solidFill>
+                  <a:srgbClr val="D4D4D4"/>
+                </a:solidFill>
+                <a:latin typeface="Consolas" panose="020B0609020204030204" pitchFamily="49" charset="0"/>
+              </a:rPr>
+              <a:t> </a:t>
+            </a:r>
+            <a:r>
+              <a:rPr lang="de-CH" dirty="0">
+                <a:solidFill>
+                  <a:srgbClr val="CE9178"/>
+                </a:solidFill>
+                <a:latin typeface="Consolas" panose="020B0609020204030204" pitchFamily="49" charset="0"/>
+              </a:rPr>
+              <a:t>"</a:t>
+            </a:r>
+            <a:r>
+              <a:rPr lang="de-CH" dirty="0" err="1">
+                <a:solidFill>
+                  <a:srgbClr val="CE9178"/>
+                </a:solidFill>
+                <a:latin typeface="Consolas" panose="020B0609020204030204" pitchFamily="49" charset="0"/>
+              </a:rPr>
+              <a:t>Initialized</a:t>
+            </a:r>
+            <a:r>
+              <a:rPr lang="de-CH" dirty="0">
+                <a:solidFill>
+                  <a:srgbClr val="CE9178"/>
+                </a:solidFill>
+                <a:latin typeface="Consolas" panose="020B0609020204030204" pitchFamily="49" charset="0"/>
+              </a:rPr>
+              <a:t>"</a:t>
+            </a:r>
+            <a:r>
+              <a:rPr lang="de-CH" dirty="0">
+                <a:solidFill>
+                  <a:srgbClr val="D4D4D4"/>
+                </a:solidFill>
+                <a:latin typeface="Consolas" panose="020B0609020204030204" pitchFamily="49" charset="0"/>
+              </a:rPr>
+              <a:t>;</a:t>
+            </a:r>
+          </a:p>
+          <a:p>
+            <a:r>
+              <a:rPr lang="de-CH" dirty="0">
+                <a:solidFill>
+                  <a:srgbClr val="C586C0"/>
+                </a:solidFill>
+                <a:latin typeface="Consolas" panose="020B0609020204030204" pitchFamily="49" charset="0"/>
+              </a:rPr>
+              <a:t>    </a:t>
+            </a:r>
+            <a:r>
+              <a:rPr lang="de-CH" dirty="0" err="1">
+                <a:solidFill>
+                  <a:srgbClr val="C586C0"/>
+                </a:solidFill>
+                <a:latin typeface="Consolas" panose="020B0609020204030204" pitchFamily="49" charset="0"/>
+              </a:rPr>
+              <a:t>case</a:t>
+            </a:r>
+            <a:r>
+              <a:rPr lang="de-CH" dirty="0">
+                <a:solidFill>
+                  <a:srgbClr val="D4D4D4"/>
+                </a:solidFill>
+                <a:latin typeface="Consolas" panose="020B0609020204030204" pitchFamily="49" charset="0"/>
+              </a:rPr>
+              <a:t> </a:t>
+            </a:r>
+            <a:r>
+              <a:rPr lang="de-CH" dirty="0">
+                <a:solidFill>
+                  <a:srgbClr val="CE9178"/>
+                </a:solidFill>
+                <a:latin typeface="Consolas" panose="020B0609020204030204" pitchFamily="49" charset="0"/>
+              </a:rPr>
+              <a:t>"LOGIN"</a:t>
+            </a:r>
+            <a:r>
+              <a:rPr lang="de-CH" dirty="0">
+                <a:solidFill>
+                  <a:srgbClr val="D4D4D4"/>
+                </a:solidFill>
+                <a:latin typeface="Consolas" panose="020B0609020204030204" pitchFamily="49" charset="0"/>
+              </a:rPr>
+              <a:t>:</a:t>
+            </a:r>
+          </a:p>
+          <a:p>
+            <a:r>
+              <a:rPr lang="de-CH" dirty="0">
+                <a:solidFill>
+                  <a:srgbClr val="4EC9B0"/>
+                </a:solidFill>
+                <a:latin typeface="Consolas" panose="020B0609020204030204" pitchFamily="49" charset="0"/>
+              </a:rPr>
+              <a:t>      console</a:t>
+            </a:r>
+            <a:r>
+              <a:rPr lang="de-CH" dirty="0">
+                <a:solidFill>
+                  <a:srgbClr val="D4D4D4"/>
+                </a:solidFill>
+                <a:latin typeface="Consolas" panose="020B0609020204030204" pitchFamily="49" charset="0"/>
+              </a:rPr>
+              <a:t>.</a:t>
+            </a:r>
+            <a:r>
+              <a:rPr lang="de-CH" dirty="0">
+                <a:solidFill>
+                  <a:srgbClr val="DCDCAA"/>
+                </a:solidFill>
+                <a:latin typeface="Consolas" panose="020B0609020204030204" pitchFamily="49" charset="0"/>
+              </a:rPr>
+              <a:t>log</a:t>
+            </a:r>
+            <a:r>
+              <a:rPr lang="de-CH" dirty="0">
+                <a:solidFill>
+                  <a:srgbClr val="D4D4D4"/>
+                </a:solidFill>
+                <a:latin typeface="Consolas" panose="020B0609020204030204" pitchFamily="49" charset="0"/>
+              </a:rPr>
+              <a:t>(</a:t>
+            </a:r>
+            <a:r>
+              <a:rPr lang="de-CH" dirty="0">
+                <a:solidFill>
+                  <a:srgbClr val="9CDCFE"/>
+                </a:solidFill>
+                <a:latin typeface="Consolas" panose="020B0609020204030204" pitchFamily="49" charset="0"/>
+              </a:rPr>
+              <a:t>action</a:t>
+            </a:r>
+            <a:r>
+              <a:rPr lang="de-CH" dirty="0">
+                <a:solidFill>
+                  <a:srgbClr val="D4D4D4"/>
+                </a:solidFill>
+                <a:latin typeface="Consolas" panose="020B0609020204030204" pitchFamily="49" charset="0"/>
+              </a:rPr>
+              <a:t>.</a:t>
+            </a:r>
+            <a:r>
+              <a:rPr lang="de-CH" dirty="0">
+                <a:solidFill>
+                  <a:srgbClr val="9CDCFE"/>
+                </a:solidFill>
+                <a:latin typeface="Consolas" panose="020B0609020204030204" pitchFamily="49" charset="0"/>
+              </a:rPr>
+              <a:t>name</a:t>
+            </a:r>
+            <a:r>
+              <a:rPr lang="de-CH" dirty="0">
+                <a:solidFill>
+                  <a:srgbClr val="D4D4D4"/>
+                </a:solidFill>
+                <a:latin typeface="Consolas" panose="020B0609020204030204" pitchFamily="49" charset="0"/>
+              </a:rPr>
+              <a:t> + </a:t>
+            </a:r>
+            <a:r>
+              <a:rPr lang="de-CH" dirty="0">
+                <a:solidFill>
+                  <a:srgbClr val="CE9178"/>
+                </a:solidFill>
+                <a:latin typeface="Consolas" panose="020B0609020204030204" pitchFamily="49" charset="0"/>
+              </a:rPr>
+              <a:t>" </a:t>
+            </a:r>
+            <a:r>
+              <a:rPr lang="de-CH" dirty="0" err="1">
+                <a:solidFill>
+                  <a:srgbClr val="CE9178"/>
+                </a:solidFill>
+                <a:latin typeface="Consolas" panose="020B0609020204030204" pitchFamily="49" charset="0"/>
+              </a:rPr>
+              <a:t>logged</a:t>
+            </a:r>
+            <a:r>
+              <a:rPr lang="de-CH" dirty="0">
+                <a:solidFill>
+                  <a:srgbClr val="CE9178"/>
+                </a:solidFill>
+                <a:latin typeface="Consolas" panose="020B0609020204030204" pitchFamily="49" charset="0"/>
+              </a:rPr>
+              <a:t> in"</a:t>
+            </a:r>
+            <a:r>
+              <a:rPr lang="de-CH" dirty="0">
+                <a:solidFill>
+                  <a:srgbClr val="D4D4D4"/>
+                </a:solidFill>
+                <a:latin typeface="Consolas" panose="020B0609020204030204" pitchFamily="49" charset="0"/>
+              </a:rPr>
+              <a:t>);</a:t>
+            </a:r>
+          </a:p>
+          <a:p>
+            <a:r>
+              <a:rPr lang="de-CH" dirty="0">
+                <a:solidFill>
+                  <a:srgbClr val="C586C0"/>
+                </a:solidFill>
+                <a:latin typeface="Consolas" panose="020B0609020204030204" pitchFamily="49" charset="0"/>
+              </a:rPr>
+              <a:t>      </a:t>
+            </a:r>
+            <a:r>
+              <a:rPr lang="de-CH" dirty="0" err="1">
+                <a:solidFill>
+                  <a:srgbClr val="C586C0"/>
+                </a:solidFill>
+                <a:latin typeface="Consolas" panose="020B0609020204030204" pitchFamily="49" charset="0"/>
+              </a:rPr>
+              <a:t>return</a:t>
+            </a:r>
+            <a:r>
+              <a:rPr lang="de-CH" dirty="0">
+                <a:solidFill>
+                  <a:srgbClr val="D4D4D4"/>
+                </a:solidFill>
+                <a:latin typeface="Consolas" panose="020B0609020204030204" pitchFamily="49" charset="0"/>
+              </a:rPr>
+              <a:t> </a:t>
+            </a:r>
+            <a:r>
+              <a:rPr lang="de-CH" dirty="0">
+                <a:solidFill>
+                  <a:srgbClr val="CE9178"/>
+                </a:solidFill>
+                <a:latin typeface="Consolas" panose="020B0609020204030204" pitchFamily="49" charset="0"/>
+              </a:rPr>
+              <a:t>"</a:t>
+            </a:r>
+            <a:r>
+              <a:rPr lang="de-CH" dirty="0" err="1">
+                <a:solidFill>
+                  <a:srgbClr val="CE9178"/>
+                </a:solidFill>
+                <a:latin typeface="Consolas" panose="020B0609020204030204" pitchFamily="49" charset="0"/>
+              </a:rPr>
+              <a:t>Logged</a:t>
+            </a:r>
+            <a:r>
+              <a:rPr lang="de-CH" dirty="0">
+                <a:solidFill>
+                  <a:srgbClr val="CE9178"/>
+                </a:solidFill>
+                <a:latin typeface="Consolas" panose="020B0609020204030204" pitchFamily="49" charset="0"/>
+              </a:rPr>
+              <a:t> In"</a:t>
+            </a:r>
+            <a:endParaRPr lang="de-CH" dirty="0">
+              <a:solidFill>
+                <a:srgbClr val="D4D4D4"/>
+              </a:solidFill>
+              <a:latin typeface="Consolas" panose="020B0609020204030204" pitchFamily="49" charset="0"/>
+            </a:endParaRPr>
+          </a:p>
+          <a:p>
+            <a:r>
+              <a:rPr lang="de-CH" dirty="0">
+                <a:solidFill>
+                  <a:srgbClr val="C586C0"/>
+                </a:solidFill>
+                <a:latin typeface="Consolas" panose="020B0609020204030204" pitchFamily="49" charset="0"/>
+              </a:rPr>
+              <a:t>    </a:t>
+            </a:r>
+            <a:r>
+              <a:rPr lang="de-CH" dirty="0" err="1">
+                <a:solidFill>
+                  <a:srgbClr val="C586C0"/>
+                </a:solidFill>
+                <a:latin typeface="Consolas" panose="020B0609020204030204" pitchFamily="49" charset="0"/>
+              </a:rPr>
+              <a:t>default</a:t>
+            </a:r>
+            <a:r>
+              <a:rPr lang="de-CH" dirty="0">
+                <a:solidFill>
+                  <a:srgbClr val="D4D4D4"/>
+                </a:solidFill>
+                <a:latin typeface="Consolas" panose="020B0609020204030204" pitchFamily="49" charset="0"/>
+              </a:rPr>
+              <a:t>:</a:t>
+            </a:r>
+          </a:p>
+          <a:p>
+            <a:r>
+              <a:rPr lang="de-CH" dirty="0">
+                <a:solidFill>
+                  <a:srgbClr val="C586C0"/>
+                </a:solidFill>
+                <a:latin typeface="Consolas" panose="020B0609020204030204" pitchFamily="49" charset="0"/>
+              </a:rPr>
+              <a:t>      </a:t>
+            </a:r>
+            <a:r>
+              <a:rPr lang="de-CH" dirty="0" err="1">
+                <a:solidFill>
+                  <a:srgbClr val="C586C0"/>
+                </a:solidFill>
+                <a:latin typeface="Consolas" panose="020B0609020204030204" pitchFamily="49" charset="0"/>
+              </a:rPr>
+              <a:t>return</a:t>
+            </a:r>
+            <a:r>
+              <a:rPr lang="de-CH" dirty="0">
+                <a:solidFill>
+                  <a:srgbClr val="D4D4D4"/>
+                </a:solidFill>
+                <a:latin typeface="Consolas" panose="020B0609020204030204" pitchFamily="49" charset="0"/>
+              </a:rPr>
+              <a:t> </a:t>
+            </a:r>
+            <a:r>
+              <a:rPr lang="de-CH" dirty="0" err="1">
+                <a:solidFill>
+                  <a:srgbClr val="DCDCAA"/>
+                </a:solidFill>
+                <a:latin typeface="Consolas" panose="020B0609020204030204" pitchFamily="49" charset="0"/>
+              </a:rPr>
+              <a:t>assertNever</a:t>
+            </a:r>
+            <a:r>
+              <a:rPr lang="de-CH" dirty="0">
+                <a:solidFill>
+                  <a:srgbClr val="D4D4D4"/>
+                </a:solidFill>
+                <a:latin typeface="Consolas" panose="020B0609020204030204" pitchFamily="49" charset="0"/>
+              </a:rPr>
+              <a:t>(</a:t>
+            </a:r>
+            <a:r>
+              <a:rPr lang="de-CH" dirty="0" err="1">
+                <a:solidFill>
+                  <a:srgbClr val="9CDCFE"/>
+                </a:solidFill>
+                <a:latin typeface="Consolas" panose="020B0609020204030204" pitchFamily="49" charset="0"/>
+              </a:rPr>
+              <a:t>action</a:t>
+            </a:r>
+            <a:r>
+              <a:rPr lang="de-CH" dirty="0">
+                <a:solidFill>
+                  <a:srgbClr val="D4D4D4"/>
+                </a:solidFill>
+                <a:latin typeface="Consolas" panose="020B0609020204030204" pitchFamily="49" charset="0"/>
+              </a:rPr>
+              <a:t>);</a:t>
+            </a:r>
+          </a:p>
+          <a:p>
+            <a:r>
+              <a:rPr lang="de-CH" dirty="0">
+                <a:solidFill>
+                  <a:srgbClr val="D4D4D4"/>
+                </a:solidFill>
+                <a:latin typeface="Consolas" panose="020B0609020204030204" pitchFamily="49" charset="0"/>
+              </a:rPr>
+              <a:t>  }</a:t>
+            </a:r>
+          </a:p>
+          <a:p>
+            <a:r>
+              <a:rPr lang="de-CH" dirty="0">
+                <a:solidFill>
+                  <a:srgbClr val="D4D4D4"/>
+                </a:solidFill>
+                <a:latin typeface="Consolas" panose="020B0609020204030204" pitchFamily="49" charset="0"/>
+              </a:rPr>
+              <a:t>}</a:t>
+            </a:r>
+          </a:p>
+        </p:txBody>
+      </p:sp>
+      <p:sp>
+        <p:nvSpPr>
+          <p:cNvPr id="5" name="Speech Bubble: Oval 4">
+            <a:extLst>
+              <a:ext uri="{FF2B5EF4-FFF2-40B4-BE49-F238E27FC236}">
+                <a16:creationId xmlns:a16="http://schemas.microsoft.com/office/drawing/2014/main" id="{1BEC9447-F78D-47DD-BB06-EE1484E63825}"/>
+              </a:ext>
+            </a:extLst>
+          </p:cNvPr>
+          <p:cNvSpPr/>
+          <p:nvPr/>
+        </p:nvSpPr>
+        <p:spPr>
+          <a:xfrm>
+            <a:off x="7666074" y="2806997"/>
+            <a:ext cx="4152014" cy="2939902"/>
+          </a:xfrm>
+          <a:prstGeom prst="wedgeEllipseCallout">
+            <a:avLst>
+              <a:gd name="adj1" fmla="val -105956"/>
+              <a:gd name="adj2" fmla="val 31157"/>
+            </a:avLst>
+          </a:prstGeom>
+          <a:solidFill>
+            <a:schemeClr val="bg1">
+              <a:lumMod val="95000"/>
+            </a:schemeClr>
+          </a:solidFill>
+          <a:ln w="76200">
+            <a:solidFill>
+              <a:srgbClr val="92D050"/>
+            </a:solidFill>
+          </a:ln>
+        </p:spPr>
+        <p:style>
+          <a:lnRef idx="2">
+            <a:schemeClr val="accent1">
+              <a:shade val="50000"/>
+            </a:schemeClr>
+          </a:lnRef>
+          <a:fillRef idx="1">
+            <a:schemeClr val="accent1"/>
+          </a:fillRef>
+          <a:effectRef idx="0">
+            <a:schemeClr val="accent1"/>
+          </a:effectRef>
+          <a:fontRef idx="minor">
+            <a:schemeClr val="lt1"/>
+          </a:fontRef>
+        </p:style>
+        <p:txBody>
+          <a:bodyPr rot="0" spcFirstLastPara="0" vertOverflow="overflow" horzOverflow="overflow" vert="horz" wrap="square" lIns="91440" tIns="45720" rIns="91440" bIns="45720" numCol="1" spcCol="0" rtlCol="0" fromWordArt="0" anchor="ctr" anchorCtr="0" forceAA="0" compatLnSpc="1">
+            <a:prstTxWarp prst="textNoShape">
+              <a:avLst/>
+            </a:prstTxWarp>
+            <a:noAutofit/>
+          </a:bodyPr>
+          <a:lstStyle/>
+          <a:p>
+            <a:pPr algn="ctr"/>
+            <a:r>
+              <a:rPr lang="en-GB" sz="3200" dirty="0">
+                <a:ln w="0"/>
+                <a:solidFill>
+                  <a:schemeClr val="tx1"/>
+                </a:solidFill>
+                <a:effectLst>
+                  <a:outerShdw blurRad="38100" dist="19050" dir="2700000" algn="tl" rotWithShape="0">
+                    <a:schemeClr val="dk1">
+                      <a:alpha val="40000"/>
+                    </a:schemeClr>
+                  </a:outerShdw>
+                </a:effectLst>
+              </a:rPr>
+              <a:t>The compiler complains if it ever reaches this point✔️ </a:t>
+            </a:r>
+          </a:p>
+        </p:txBody>
+      </p:sp>
+    </p:spTree>
+    <p:extLst>
+      <p:ext uri="{BB962C8B-B14F-4D97-AF65-F5344CB8AC3E}">
+        <p14:creationId xmlns:p14="http://schemas.microsoft.com/office/powerpoint/2010/main" val="3107618164"/>
+      </p:ext>
+    </p:extLst>
+  </p:cSld>
+  <p:clrMapOvr>
+    <a:masterClrMapping/>
+  </p:clrMapOvr>
+  <p:timing>
+    <p:tnLst>
+      <p:par>
+        <p:cTn id="1" dur="indefinite" restart="never" nodeType="tmRoot">
+          <p:childTnLst>
+            <p:seq concurrent="1" nextAc="seek">
+              <p:cTn id="2" dur="indefinite" nodeType="mainSeq">
+                <p:childTnLst>
+                  <p:par>
+                    <p:cTn id="3" fill="hold">
+                      <p:stCondLst>
+                        <p:cond delay="indefinite"/>
+                      </p:stCondLst>
+                      <p:childTnLst>
+                        <p:par>
+                          <p:cTn id="4" fill="hold">
+                            <p:stCondLst>
+                              <p:cond delay="0"/>
+                            </p:stCondLst>
+                            <p:childTnLst>
+                              <p:par>
+                                <p:cTn id="5" presetID="1" presetClass="entr" presetSubtype="0" fill="hold" grpId="0" nodeType="clickEffect">
+                                  <p:stCondLst>
+                                    <p:cond delay="0"/>
+                                  </p:stCondLst>
+                                  <p:childTnLst>
+                                    <p:set>
+                                      <p:cBhvr>
+                                        <p:cTn id="6" dur="1" fill="hold">
+                                          <p:stCondLst>
+                                            <p:cond delay="0"/>
+                                          </p:stCondLst>
+                                        </p:cTn>
+                                        <p:tgtEl>
+                                          <p:spTgt spid="5"/>
+                                        </p:tgtEl>
+                                        <p:attrNameLst>
+                                          <p:attrName>style.visibility</p:attrName>
+                                        </p:attrNameLst>
+                                      </p:cBhvr>
+                                      <p:to>
+                                        <p:strVal val="visible"/>
+                                      </p:to>
+                                    </p:set>
+                                  </p:childTnLst>
+                                </p:cTn>
+                              </p:par>
+                            </p:childTnLst>
+                          </p:cTn>
+                        </p:par>
+                      </p:childTnLst>
+                    </p:cTn>
+                  </p:par>
+                </p:childTnLst>
+              </p:cTn>
+              <p:prevCondLst>
+                <p:cond evt="onPrev" delay="0">
+                  <p:tgtEl>
+                    <p:sldTgt/>
+                  </p:tgtEl>
+                </p:cond>
+              </p:prevCondLst>
+              <p:nextCondLst>
+                <p:cond evt="onNext" delay="0">
+                  <p:tgtEl>
+                    <p:sldTgt/>
+                  </p:tgtEl>
+                </p:cond>
+              </p:nextCondLst>
+            </p:seq>
+          </p:childTnLst>
+        </p:cTn>
+      </p:par>
+    </p:tnLst>
+    <p:bldLst>
+      <p:bldP spid="5" grpId="0" animBg="1"/>
+    </p:bldLst>
+  </p:timing>
+</p:sld>
+</file>
+
+<file path=ppt/slides/slide23.xml><?xml version="1.0" encoding="utf-8"?>
 <p:sld xmlns:a="http://schemas.openxmlformats.org/drawingml/2006/main" xmlns:r="http://schemas.openxmlformats.org/officeDocument/2006/relationships" xmlns:p="http://schemas.openxmlformats.org/presentationml/2006/main">
   <p:cSld>
     <p:spTree>
@@ -11500,90 +15033,7 @@
 </p:sld>
 </file>
 
-<file path=ppt/slides/slide22.xml><?xml version="1.0" encoding="utf-8"?>
-<p:sld xmlns:a="http://schemas.openxmlformats.org/drawingml/2006/main" xmlns:r="http://schemas.openxmlformats.org/officeDocument/2006/relationships" xmlns:p="http://schemas.openxmlformats.org/presentationml/2006/main">
-  <p:cSld>
-    <p:spTree>
-      <p:nvGrpSpPr>
-        <p:cNvPr id="1" name=""/>
-        <p:cNvGrpSpPr/>
-        <p:nvPr/>
-      </p:nvGrpSpPr>
-      <p:grpSpPr>
-        <a:xfrm>
-          <a:off x="0" y="0"/>
-          <a:ext cx="0" cy="0"/>
-          <a:chOff x="0" y="0"/>
-          <a:chExt cx="0" cy="0"/>
-        </a:xfrm>
-      </p:grpSpPr>
-      <p:sp>
-        <p:nvSpPr>
-          <p:cNvPr id="4" name="Title 3">
-            <a:extLst>
-              <a:ext uri="{FF2B5EF4-FFF2-40B4-BE49-F238E27FC236}">
-                <a16:creationId xmlns:a16="http://schemas.microsoft.com/office/drawing/2014/main" id="{1956786B-2938-4199-B1DA-0E2983FB2BD1}"/>
-              </a:ext>
-            </a:extLst>
-          </p:cNvPr>
-          <p:cNvSpPr>
-            <a:spLocks noGrp="1"/>
-          </p:cNvSpPr>
-          <p:nvPr>
-            <p:ph type="title"/>
-          </p:nvPr>
-        </p:nvSpPr>
-        <p:spPr/>
-        <p:txBody>
-          <a:bodyPr/>
-          <a:lstStyle/>
-          <a:p>
-            <a:r>
-              <a:rPr lang="en-GB" dirty="0"/>
-              <a:t>Product Type</a:t>
-            </a:r>
-          </a:p>
-        </p:txBody>
-      </p:sp>
-      <p:sp>
-        <p:nvSpPr>
-          <p:cNvPr id="5" name="Content Placeholder 4">
-            <a:extLst>
-              <a:ext uri="{FF2B5EF4-FFF2-40B4-BE49-F238E27FC236}">
-                <a16:creationId xmlns:a16="http://schemas.microsoft.com/office/drawing/2014/main" id="{B68F69AF-9F4D-4281-B1A2-3CDCCA78F09C}"/>
-              </a:ext>
-            </a:extLst>
-          </p:cNvPr>
-          <p:cNvSpPr>
-            <a:spLocks noGrp="1"/>
-          </p:cNvSpPr>
-          <p:nvPr>
-            <p:ph idx="1"/>
-          </p:nvPr>
-        </p:nvSpPr>
-        <p:spPr/>
-        <p:txBody>
-          <a:bodyPr/>
-          <a:lstStyle/>
-          <a:p>
-            <a:endParaRPr lang="en-GB" dirty="0"/>
-          </a:p>
-        </p:txBody>
-      </p:sp>
-    </p:spTree>
-    <p:extLst>
-      <p:ext uri="{BB962C8B-B14F-4D97-AF65-F5344CB8AC3E}">
-        <p14:creationId xmlns:p14="http://schemas.microsoft.com/office/powerpoint/2010/main" val="4000818841"/>
-      </p:ext>
-    </p:extLst>
-  </p:cSld>
-  <p:clrMapOvr>
-    <a:masterClrMapping/>
-  </p:clrMapOvr>
-</p:sld>
-</file>
-
-<file path=ppt/slides/slide23.xml><?xml version="1.0" encoding="utf-8"?>
+<file path=ppt/slides/slide24.xml><?xml version="1.0" encoding="utf-8"?>
 <p:sld xmlns:a="http://schemas.openxmlformats.org/drawingml/2006/main" xmlns:r="http://schemas.openxmlformats.org/officeDocument/2006/relationships" xmlns:p="http://schemas.openxmlformats.org/presentationml/2006/main">
   <p:cSld>
     <p:spTree>

</xml_diff>

<commit_message>
Adjusted the layout a bit to give it more structure
</commit_message>
<xml_diff>
--- a/a-type-of-magic.pptx
+++ b/a-type-of-magic.pptx
@@ -2562,6 +2562,61 @@
       </p:grpSpPr>
       <p:sp>
         <p:nvSpPr>
+          <p:cNvPr id="7" name="Rectangle 6">
+            <a:extLst>
+              <a:ext uri="{FF2B5EF4-FFF2-40B4-BE49-F238E27FC236}">
+                <a16:creationId xmlns:a16="http://schemas.microsoft.com/office/drawing/2014/main" id="{D1105DFB-5D2F-42CF-9662-01745B76BF24}"/>
+              </a:ext>
+            </a:extLst>
+          </p:cNvPr>
+          <p:cNvSpPr/>
+          <p:nvPr userDrawn="1"/>
+        </p:nvSpPr>
+        <p:spPr>
+          <a:xfrm>
+            <a:off x="0" y="1"/>
+            <a:ext cx="12192000" cy="956930"/>
+          </a:xfrm>
+          <a:prstGeom prst="rect">
+            <a:avLst/>
+          </a:prstGeom>
+          <a:solidFill>
+            <a:schemeClr val="tx1">
+              <a:lumMod val="75000"/>
+              <a:lumOff val="25000"/>
+            </a:schemeClr>
+          </a:solidFill>
+          <a:ln>
+            <a:noFill/>
+          </a:ln>
+        </p:spPr>
+        <p:style>
+          <a:lnRef idx="2">
+            <a:schemeClr val="accent1">
+              <a:shade val="50000"/>
+            </a:schemeClr>
+          </a:lnRef>
+          <a:fillRef idx="1">
+            <a:schemeClr val="accent1"/>
+          </a:fillRef>
+          <a:effectRef idx="0">
+            <a:schemeClr val="accent1"/>
+          </a:effectRef>
+          <a:fontRef idx="minor">
+            <a:schemeClr val="lt1"/>
+          </a:fontRef>
+        </p:style>
+        <p:txBody>
+          <a:bodyPr rtlCol="0" anchor="ctr"/>
+          <a:lstStyle/>
+          <a:p>
+            <a:pPr algn="ctr"/>
+            <a:endParaRPr lang="en-GB"/>
+          </a:p>
+        </p:txBody>
+      </p:sp>
+      <p:sp>
+        <p:nvSpPr>
           <p:cNvPr id="2" name="Title 1">
             <a:extLst>
               <a:ext uri="{FF2B5EF4-FFF2-40B4-BE49-F238E27FC236}">
@@ -2576,10 +2631,23 @@
             <p:ph type="title"/>
           </p:nvPr>
         </p:nvSpPr>
-        <p:spPr/>
+        <p:spPr>
+          <a:xfrm>
+            <a:off x="268310" y="-1"/>
+            <a:ext cx="11655381" cy="1084522"/>
+          </a:xfrm>
+        </p:spPr>
         <p:txBody>
-          <a:bodyPr/>
-          <a:lstStyle/>
+          <a:bodyPr tIns="0" bIns="0"/>
+          <a:lstStyle>
+            <a:lvl1pPr>
+              <a:defRPr>
+                <a:solidFill>
+                  <a:schemeClr val="bg1"/>
+                </a:solidFill>
+              </a:defRPr>
+            </a:lvl1pPr>
+          </a:lstStyle>
           <a:p>
             <a:r>
               <a:rPr lang="en-US"/>
@@ -5492,7 +5560,7 @@
         </p:blipFill>
         <p:spPr bwMode="auto">
           <a:xfrm>
-            <a:off x="7521951" y="681037"/>
+            <a:off x="8039443" y="1526325"/>
             <a:ext cx="3831849" cy="3511826"/>
           </a:xfrm>
           <a:prstGeom prst="rect">
@@ -9184,7 +9252,7 @@
         </p:blipFill>
         <p:spPr bwMode="auto">
           <a:xfrm>
-            <a:off x="6363586" y="216453"/>
+            <a:off x="6521936" y="1472941"/>
             <a:ext cx="5784706" cy="3912118"/>
           </a:xfrm>
           <a:prstGeom prst="rect">
@@ -9502,7 +9570,7 @@
         </p:blipFill>
         <p:spPr bwMode="auto">
           <a:xfrm>
-            <a:off x="6300730" y="205637"/>
+            <a:off x="6406800" y="1450773"/>
             <a:ext cx="5785200" cy="3956454"/>
           </a:xfrm>
           <a:prstGeom prst="rect">
@@ -9973,7 +10041,7 @@
             </a:pPr>
             <a:r>
               <a:rPr lang="en-GB" dirty="0"/>
-              <a:t>And some more </a:t>
+              <a:t>And others apply as well </a:t>
             </a:r>
             <a:r>
               <a:rPr lang="en-GB" dirty="0">
@@ -11204,13 +11272,13 @@
             <a:spLocks noGrp="1"/>
           </p:cNvSpPr>
           <p:nvPr>
-            <p:ph idx="1"/>
+            <p:ph idx="4294967295"/>
           </p:nvPr>
         </p:nvSpPr>
         <p:spPr>
           <a:xfrm>
-            <a:off x="2813957" y="4359890"/>
-            <a:ext cx="6564086" cy="519469"/>
+            <a:off x="2814638" y="4359275"/>
+            <a:ext cx="6562725" cy="520700"/>
           </a:xfrm>
         </p:spPr>
         <p:txBody>
@@ -15215,6 +15283,9 @@
           <a:bodyPr/>
           <a:lstStyle/>
           <a:p>
+            <a:endParaRPr lang="en-GB" dirty="0"/>
+          </a:p>
+          <a:p>
             <a:r>
               <a:rPr lang="en-GB" dirty="0"/>
               <a:t>Generics</a:t>
@@ -15268,6 +15339,7 @@
         </p:nvPicPr>
         <p:blipFill>
           <a:blip r:embed="rId2">
+            <a:biLevel thresh="25000"/>
             <a:extLst>
               <a:ext uri="{28A0092B-C50C-407E-A947-70E740481C1C}">
                 <a14:useLocalDpi xmlns:a14="http://schemas.microsoft.com/office/drawing/2010/main" val="0"/>
@@ -15281,7 +15353,7 @@
         </p:blipFill>
         <p:spPr bwMode="auto">
           <a:xfrm>
-            <a:off x="613476" y="437071"/>
+            <a:off x="81847" y="-69486"/>
             <a:ext cx="3214138" cy="1181670"/>
           </a:xfrm>
           <a:prstGeom prst="rect">
@@ -15413,6 +15485,9 @@
             <a:endParaRPr lang="en-GB" dirty="0"/>
           </a:p>
           <a:p>
+            <a:endParaRPr lang="en-GB" dirty="0"/>
+          </a:p>
+          <a:p>
             <a:r>
               <a:rPr lang="en-GB" dirty="0"/>
               <a:t>Enable </a:t>
@@ -15447,7 +15522,7 @@
         </p:nvSpPr>
         <p:spPr>
           <a:xfrm>
-            <a:off x="838200" y="3184451"/>
+            <a:off x="838200" y="2743200"/>
             <a:ext cx="10515600" cy="2246769"/>
           </a:xfrm>
           <a:prstGeom prst="rect">
@@ -15731,6 +15806,9 @@
         <p:txBody>
           <a:bodyPr/>
           <a:lstStyle/>
+          <a:p>
+            <a:endParaRPr lang="en-GB" b="1" dirty="0"/>
+          </a:p>
           <a:p>
             <a:r>
               <a:rPr lang="en-GB" b="1" dirty="0"/>
@@ -16032,6 +16110,22 @@
               <a:rPr lang="en-GB" dirty="0"/>
               <a:t>What is a Set? A collection of Objects</a:t>
             </a:r>
+          </a:p>
+          <a:p>
+            <a:endParaRPr lang="en-GB" dirty="0"/>
+          </a:p>
+          <a:p>
+            <a:r>
+              <a:rPr lang="en-GB" dirty="0"/>
+              <a:t>What is a Type? A class of Objects</a:t>
+            </a:r>
+            <a:br>
+              <a:rPr lang="en-GB" dirty="0"/>
+            </a:br>
+            <a:r>
+              <a:rPr lang="en-GB" dirty="0"/>
+              <a:t>confining to a set of constraints</a:t>
+            </a:r>
             <a:br>
               <a:rPr lang="en-GB" dirty="0"/>
             </a:br>
@@ -16165,19 +16259,25 @@
           <a:p>
             <a:r>
               <a:rPr lang="de-CH" dirty="0"/>
-              <a:t>Boolean</a:t>
-            </a:r>
+              <a:t>Boolean?</a:t>
+            </a:r>
+          </a:p>
+          <a:p>
+            <a:endParaRPr lang="de-CH" dirty="0"/>
           </a:p>
           <a:p>
             <a:r>
               <a:rPr lang="de-CH" dirty="0"/>
-              <a:t>Integer</a:t>
-            </a:r>
+              <a:t>Integer?</a:t>
+            </a:r>
+          </a:p>
+          <a:p>
+            <a:endParaRPr lang="de-CH" dirty="0"/>
           </a:p>
           <a:p>
             <a:r>
               <a:rPr lang="de-CH" dirty="0"/>
-              <a:t>String</a:t>
+              <a:t>String?</a:t>
             </a:r>
           </a:p>
           <a:p>
@@ -16460,7 +16560,7 @@
                                         <p:tgtEl>
                                           <p:spTgt spid="3">
                                             <p:txEl>
-                                              <p:pRg st="1" end="1"/>
+                                              <p:pRg st="2" end="2"/>
                                             </p:txEl>
                                           </p:spTgt>
                                         </p:tgtEl>
@@ -16554,7 +16654,7 @@
                                         <p:tgtEl>
                                           <p:spTgt spid="3">
                                             <p:txEl>
-                                              <p:pRg st="2" end="2"/>
+                                              <p:pRg st="4" end="4"/>
                                             </p:txEl>
                                           </p:spTgt>
                                         </p:tgtEl>

</xml_diff>